<commit_message>
# Agregue algunas speaker notes
</commit_message>
<xml_diff>
--- a/doc/presentaciones/Presentación inicial v2.pptx
+++ b/doc/presentaciones/Presentación inicial v2.pptx
@@ -5,10 +5,10 @@
     <p:sldMasterId id="2147483648" r:id="rId1"/>
   </p:sldMasterIdLst>
   <p:notesMasterIdLst>
-    <p:notesMasterId r:id="rId27"/>
+    <p:notesMasterId r:id="rId26"/>
   </p:notesMasterIdLst>
   <p:handoutMasterIdLst>
-    <p:handoutMasterId r:id="rId28"/>
+    <p:handoutMasterId r:id="rId27"/>
   </p:handoutMasterIdLst>
   <p:sldIdLst>
     <p:sldId id="256" r:id="rId2"/>
@@ -29,13 +29,12 @@
     <p:sldId id="287" r:id="rId17"/>
     <p:sldId id="282" r:id="rId18"/>
     <p:sldId id="277" r:id="rId19"/>
-    <p:sldId id="292" r:id="rId20"/>
-    <p:sldId id="278" r:id="rId21"/>
-    <p:sldId id="284" r:id="rId22"/>
-    <p:sldId id="285" r:id="rId23"/>
-    <p:sldId id="286" r:id="rId24"/>
-    <p:sldId id="293" r:id="rId25"/>
-    <p:sldId id="264" r:id="rId26"/>
+    <p:sldId id="278" r:id="rId20"/>
+    <p:sldId id="284" r:id="rId21"/>
+    <p:sldId id="285" r:id="rId22"/>
+    <p:sldId id="286" r:id="rId23"/>
+    <p:sldId id="293" r:id="rId24"/>
+    <p:sldId id="264" r:id="rId25"/>
   </p:sldIdLst>
   <p:sldSz cx="9144000" cy="6858000" type="screen4x3"/>
   <p:notesSz cx="6858000" cy="9144000"/>
@@ -925,7 +924,34 @@
           <a:lstStyle/>
           <a:p>
             <a:pPr eaLnBrk="1" hangingPunct="1"/>
-            <a:endParaRPr lang="es-AR" smtClean="0"/>
+            <a:r>
+              <a:rPr lang="es-AR" dirty="0" smtClean="0"/>
+              <a:t>Speaker:</a:t>
+            </a:r>
+            <a:r>
+              <a:rPr lang="es-AR" baseline="0" dirty="0" smtClean="0"/>
+              <a:t> </a:t>
+            </a:r>
+          </a:p>
+          <a:p>
+            <a:pPr eaLnBrk="1" hangingPunct="1"/>
+            <a:endParaRPr lang="es-AR" baseline="0" dirty="0" smtClean="0"/>
+          </a:p>
+          <a:p>
+            <a:pPr eaLnBrk="1" hangingPunct="1"/>
+            <a:r>
+              <a:rPr lang="es-AR" b="0" baseline="0" dirty="0" smtClean="0"/>
+              <a:t>En esta presentación vamos a explicar y mostrar como encararemos el proyecto de desarrollo de la aplicación </a:t>
+            </a:r>
+            <a:r>
+              <a:rPr lang="es-AR" b="0" baseline="0" dirty="0" err="1" smtClean="0"/>
+              <a:t>SelfManagement</a:t>
+            </a:r>
+            <a:r>
+              <a:rPr lang="es-AR" b="0" baseline="0" dirty="0" smtClean="0"/>
+              <a:t>.</a:t>
+            </a:r>
+            <a:endParaRPr lang="es-AR" dirty="0" smtClean="0"/>
           </a:p>
         </p:txBody>
       </p:sp>
@@ -1014,36 +1040,46 @@
           <a:p>
             <a:pPr>
               <a:buFontTx/>
-              <a:buChar char="•"/>
+              <a:buNone/>
             </a:pPr>
             <a:r>
-              <a:rPr lang="es-AR" smtClean="0"/>
-              <a:t> Analisis: Diagrama de Casos de Uso + User Stories. Se hara un diagrama de casos de uso, y luego se identificaran user stories para el backlog del pivotal tracker.</a:t>
+              <a:rPr lang="es-AR" dirty="0" smtClean="0"/>
+              <a:t>Speaker: </a:t>
             </a:r>
           </a:p>
           <a:p>
             <a:pPr>
               <a:buFontTx/>
-              <a:buChar char="•"/>
+              <a:buNone/>
             </a:pPr>
-            <a:r>
-              <a:rPr lang="es-AR" smtClean="0"/>
-              <a:t> Arquitectura y diseño: Diagrama 4 + 1 (D. Clases/Secuencia, D. Componentes/Paquetes, D. Procesos, D. Despliegue) + (D. Casos de uso). Los diagramas de 4+1 permiten describir la arquitectura de un sistema, mediante distintas vistas concurrentes.</a:t>
-            </a:r>
+            <a:endParaRPr lang="es-AR" dirty="0" smtClean="0"/>
           </a:p>
           <a:p>
             <a:pPr>
               <a:buFontTx/>
-              <a:buChar char="•"/>
+              <a:buNone/>
             </a:pPr>
             <a:r>
-              <a:rPr lang="es-AR" smtClean="0"/>
-              <a:t> Herramientas de validación Análisis y Diseño: Este es una aplicación que permite crear mocks de las vistas que seran creadas en el sistema. De esta forma, pueden validarse con el usuario antes de codificar.</a:t>
-            </a:r>
+              <a:rPr lang="es-AR" dirty="0" smtClean="0"/>
+              <a:t>(</a:t>
+            </a:r>
+            <a:r>
+              <a:rPr lang="es-AR" dirty="0" err="1" smtClean="0"/>
+              <a:t>Explicacion</a:t>
+            </a:r>
+            <a:r>
+              <a:rPr lang="es-AR" baseline="0" dirty="0" smtClean="0"/>
+              <a:t> del </a:t>
+            </a:r>
+            <a:r>
+              <a:rPr lang="es-AR" dirty="0" smtClean="0"/>
+              <a:t>diagrama de arquitectura)</a:t>
+            </a:r>
+            <a:endParaRPr lang="es-AR" dirty="0" smtClean="0"/>
           </a:p>
           <a:p>
             <a:pPr eaLnBrk="1" hangingPunct="1"/>
-            <a:endParaRPr lang="es-AR" smtClean="0"/>
+            <a:endParaRPr lang="es-AR" dirty="0" smtClean="0"/>
           </a:p>
         </p:txBody>
       </p:sp>
@@ -1131,7 +1167,25 @@
           <a:lstStyle/>
           <a:p>
             <a:pPr eaLnBrk="1" hangingPunct="1"/>
-            <a:endParaRPr lang="es-AR" smtClean="0"/>
+            <a:r>
+              <a:rPr lang="es-AR" dirty="0" smtClean="0"/>
+              <a:t>Speaker:</a:t>
+            </a:r>
+          </a:p>
+          <a:p>
+            <a:pPr eaLnBrk="1" hangingPunct="1"/>
+            <a:endParaRPr lang="es-AR" dirty="0" smtClean="0"/>
+          </a:p>
+          <a:p>
+            <a:pPr eaLnBrk="1" hangingPunct="1"/>
+            <a:r>
+              <a:rPr lang="es-ES_tradnl" baseline="0" dirty="0" smtClean="0"/>
+              <a:t>Las pruebas unitarias van a ser las que provee el Visual Studio</a:t>
+            </a:r>
+          </a:p>
+          <a:p>
+            <a:pPr eaLnBrk="1" hangingPunct="1"/>
+            <a:endParaRPr lang="es-ES_tradnl" baseline="0" dirty="0" smtClean="0"/>
           </a:p>
         </p:txBody>
       </p:sp>
@@ -1218,8 +1272,132 @@
           <a:bodyPr/>
           <a:lstStyle/>
           <a:p>
+            <a:pPr>
+              <a:buFont typeface="Arial" pitchFamily="34" charset="0"/>
+              <a:buNone/>
+            </a:pPr>
+            <a:r>
+              <a:rPr lang="es-AR" dirty="0" smtClean="0"/>
+              <a:t>Speaker: </a:t>
+            </a:r>
+          </a:p>
+          <a:p>
+            <a:pPr>
+              <a:buFont typeface="Arial" pitchFamily="34" charset="0"/>
+              <a:buChar char="•"/>
+            </a:pPr>
+            <a:endParaRPr lang="es-AR" dirty="0" smtClean="0"/>
+          </a:p>
+          <a:p>
+            <a:pPr>
+              <a:buFont typeface="Arial" pitchFamily="34" charset="0"/>
+              <a:buChar char="•"/>
+            </a:pPr>
+            <a:r>
+              <a:rPr lang="es-AR" dirty="0" smtClean="0"/>
+              <a:t>El seguimiento y control de proyecto se realizara semana</a:t>
+            </a:r>
+            <a:r>
+              <a:rPr lang="es-AR" baseline="0" dirty="0" smtClean="0"/>
+              <a:t> a semana y por parte de los mismos integrantes del </a:t>
+            </a:r>
+            <a:r>
+              <a:rPr lang="es-AR" baseline="0" dirty="0" err="1" smtClean="0"/>
+              <a:t>Team</a:t>
+            </a:r>
+            <a:r>
+              <a:rPr lang="es-AR" baseline="0" dirty="0" smtClean="0"/>
+              <a:t> y el </a:t>
+            </a:r>
+            <a:r>
+              <a:rPr lang="es-AR" baseline="0" dirty="0" err="1" smtClean="0"/>
+              <a:t>Scrum</a:t>
+            </a:r>
+            <a:r>
+              <a:rPr lang="es-AR" baseline="0" dirty="0" smtClean="0"/>
+              <a:t> </a:t>
+            </a:r>
+            <a:r>
+              <a:rPr lang="es-AR" baseline="0" dirty="0" err="1" smtClean="0"/>
+              <a:t>Master</a:t>
+            </a:r>
+            <a:r>
+              <a:rPr lang="es-AR" baseline="0" dirty="0" smtClean="0"/>
+              <a:t>.</a:t>
+            </a:r>
+          </a:p>
+          <a:p>
+            <a:pPr>
+              <a:buFont typeface="Arial" pitchFamily="34" charset="0"/>
+              <a:buChar char="•"/>
+            </a:pPr>
+            <a:r>
+              <a:rPr lang="es-AR" dirty="0" smtClean="0"/>
+              <a:t>Se utilizaran</a:t>
+            </a:r>
+            <a:r>
+              <a:rPr lang="es-AR" baseline="0" dirty="0" smtClean="0"/>
+              <a:t> los indicadores de </a:t>
+            </a:r>
+            <a:r>
+              <a:rPr lang="es-AR" baseline="0" dirty="0" err="1" smtClean="0"/>
+              <a:t>Evolucion</a:t>
+            </a:r>
+            <a:r>
+              <a:rPr lang="es-AR" baseline="0" dirty="0" smtClean="0"/>
+              <a:t> y Cobertura de la prueba. El primero sirve para obtener el ritmo de </a:t>
+            </a:r>
+            <a:r>
+              <a:rPr lang="es-AR" baseline="0" dirty="0" err="1" smtClean="0"/>
+              <a:t>correccion</a:t>
+            </a:r>
+            <a:r>
+              <a:rPr lang="es-AR" baseline="0" dirty="0" smtClean="0"/>
+              <a:t> de </a:t>
+            </a:r>
+            <a:r>
+              <a:rPr lang="es-AR" baseline="0" dirty="0" err="1" smtClean="0"/>
+              <a:t>bugs</a:t>
+            </a:r>
+            <a:r>
+              <a:rPr lang="es-AR" baseline="0" dirty="0" smtClean="0"/>
+              <a:t> y el segundo para medir el avance</a:t>
+            </a:r>
+            <a:endParaRPr lang="es-AR" dirty="0" smtClean="0"/>
+          </a:p>
+          <a:p>
+            <a:pPr>
+              <a:buFont typeface="Arial" pitchFamily="34" charset="0"/>
+              <a:buChar char="•"/>
+            </a:pPr>
+            <a:r>
+              <a:rPr lang="es-AR" dirty="0" smtClean="0"/>
+              <a:t>También utilizaremos</a:t>
+            </a:r>
+            <a:r>
+              <a:rPr lang="es-AR" baseline="0" dirty="0" smtClean="0"/>
+              <a:t> el </a:t>
+            </a:r>
+            <a:r>
+              <a:rPr lang="es-AR" dirty="0" err="1" smtClean="0"/>
+              <a:t>Burndown</a:t>
+            </a:r>
+            <a:r>
+              <a:rPr lang="es-AR" baseline="0" dirty="0" smtClean="0"/>
+              <a:t> Chart. En dicho gráfico (que se actualizara diariamente), se compara el esfuerzo que resta hacer para finalizar en Sprint en función del tiempo. Sirve para predecir cuando terminará el Sprint, y contrastarlo también con un ritmo de trabajo ideal (ideal </a:t>
+            </a:r>
+            <a:r>
+              <a:rPr lang="es-AR" baseline="0" dirty="0" err="1" smtClean="0"/>
+              <a:t>burndown</a:t>
+            </a:r>
+            <a:r>
+              <a:rPr lang="es-AR" baseline="0" dirty="0" smtClean="0"/>
+              <a:t>).</a:t>
+            </a:r>
+          </a:p>
+          <a:p>
             <a:pPr eaLnBrk="1" hangingPunct="1"/>
-            <a:endParaRPr lang="es-AR" smtClean="0"/>
+            <a:endParaRPr lang="es-AR" dirty="0" smtClean="0"/>
           </a:p>
         </p:txBody>
       </p:sp>
@@ -1307,7 +1485,99 @@
           <a:lstStyle/>
           <a:p>
             <a:pPr eaLnBrk="1" hangingPunct="1"/>
-            <a:endParaRPr lang="es-AR" smtClean="0"/>
+            <a:r>
+              <a:rPr lang="es-AR" dirty="0" smtClean="0"/>
+              <a:t>Speaker:</a:t>
+            </a:r>
+            <a:r>
+              <a:rPr lang="es-AR" baseline="0" dirty="0" smtClean="0"/>
+              <a:t> </a:t>
+            </a:r>
+            <a:endParaRPr lang="es-AR" dirty="0" smtClean="0"/>
+          </a:p>
+          <a:p>
+            <a:pPr eaLnBrk="1" hangingPunct="1"/>
+            <a:endParaRPr lang="es-AR" dirty="0" smtClean="0"/>
+          </a:p>
+          <a:p>
+            <a:pPr>
+              <a:buFont typeface="Arial" pitchFamily="34" charset="0"/>
+              <a:buChar char="•"/>
+            </a:pPr>
+            <a:r>
+              <a:rPr lang="es-AR" b="0" baseline="0" dirty="0" smtClean="0"/>
+              <a:t> Al inicio del proyecto realizaremos las tareas de Identificación, Análisis y Planificación (plan de mitigación y contingencia) de Riesgos.</a:t>
+            </a:r>
+          </a:p>
+          <a:p>
+            <a:pPr>
+              <a:buFont typeface="Arial" pitchFamily="34" charset="0"/>
+              <a:buChar char="•"/>
+            </a:pPr>
+            <a:r>
+              <a:rPr lang="es-AR" b="0" baseline="0" dirty="0" smtClean="0"/>
+              <a:t> Esto quedará plasmado en una Planilla de Riesgos.</a:t>
+            </a:r>
+          </a:p>
+          <a:p>
+            <a:pPr>
+              <a:buFont typeface="Arial" pitchFamily="34" charset="0"/>
+              <a:buChar char="•"/>
+            </a:pPr>
+            <a:r>
+              <a:rPr lang="es-AR" b="0" baseline="0" dirty="0" smtClean="0"/>
+              <a:t> Realizaremos el Seguimiento y Control de los riesgos listados en la Planilla en las Reuniones de </a:t>
+            </a:r>
+            <a:r>
+              <a:rPr lang="es-AR" b="0" baseline="0" dirty="0" err="1" smtClean="0"/>
+              <a:t>Team</a:t>
+            </a:r>
+            <a:r>
+              <a:rPr lang="es-AR" b="0" baseline="0" dirty="0" smtClean="0"/>
+              <a:t>. Dicha tabla sufrirá modificaciones/actualizaciones a lo largo del proyecto.</a:t>
+            </a:r>
+          </a:p>
+          <a:p>
+            <a:pPr>
+              <a:buFont typeface="Arial" pitchFamily="34" charset="0"/>
+              <a:buChar char="•"/>
+            </a:pPr>
+            <a:r>
+              <a:rPr lang="es-AR" b="0" baseline="0" dirty="0" smtClean="0"/>
+              <a:t> Encararemos una metodología de tratamiento de riesgos PROACTIVA. </a:t>
+            </a:r>
+          </a:p>
+          <a:p>
+            <a:pPr>
+              <a:buFont typeface="Arial" pitchFamily="34" charset="0"/>
+              <a:buChar char="•"/>
+            </a:pPr>
+            <a:r>
+              <a:rPr lang="es-AR" b="0" baseline="0" dirty="0" smtClean="0"/>
+              <a:t> Significa que trataremos de mitigarlos, haciendo todo lo posible para que no sucedan, y no tener que actuar sintomáticamente una vez que sucedieron.</a:t>
+            </a:r>
+          </a:p>
+          <a:p>
+            <a:pPr>
+              <a:buFont typeface="Arial" pitchFamily="34" charset="0"/>
+              <a:buChar char="•"/>
+            </a:pPr>
+            <a:r>
+              <a:rPr lang="es-AR" b="0" baseline="0" dirty="0" smtClean="0"/>
+              <a:t> Esto refuerza la importancia del proceso de seguimiento y control por parte del </a:t>
+            </a:r>
+            <a:r>
+              <a:rPr lang="es-AR" b="0" baseline="0" dirty="0" err="1" smtClean="0"/>
+              <a:t>Team</a:t>
+            </a:r>
+            <a:r>
+              <a:rPr lang="es-AR" b="0" baseline="0" dirty="0" smtClean="0"/>
+              <a:t> en las reuniones que se considere necesario.</a:t>
+            </a:r>
+          </a:p>
+          <a:p>
+            <a:pPr eaLnBrk="1" hangingPunct="1"/>
+            <a:endParaRPr lang="es-AR" dirty="0" smtClean="0"/>
           </a:p>
         </p:txBody>
       </p:sp>
@@ -1394,8 +1664,95 @@
           <a:bodyPr/>
           <a:lstStyle/>
           <a:p>
+            <a:pPr>
+              <a:buFont typeface="Arial" pitchFamily="34" charset="0"/>
+              <a:buNone/>
+            </a:pPr>
+            <a:r>
+              <a:rPr lang="es-AR" b="0" dirty="0" smtClean="0"/>
+              <a:t>Speaker:</a:t>
+            </a:r>
+            <a:r>
+              <a:rPr lang="es-AR" b="0" baseline="0" dirty="0" smtClean="0"/>
+              <a:t> </a:t>
+            </a:r>
+            <a:endParaRPr lang="es-AR" b="0" dirty="0" smtClean="0"/>
+          </a:p>
+          <a:p>
+            <a:pPr>
+              <a:buFont typeface="Arial" pitchFamily="34" charset="0"/>
+              <a:buChar char="•"/>
+            </a:pPr>
+            <a:endParaRPr lang="es-AR" b="0" dirty="0" smtClean="0"/>
+          </a:p>
+          <a:p>
+            <a:pPr>
+              <a:buFont typeface="Arial" pitchFamily="34" charset="0"/>
+              <a:buChar char="•"/>
+            </a:pPr>
+            <a:r>
+              <a:rPr lang="es-AR" b="0" dirty="0" smtClean="0"/>
+              <a:t>En</a:t>
+            </a:r>
+            <a:r>
+              <a:rPr lang="es-AR" b="0" baseline="0" dirty="0" smtClean="0"/>
+              <a:t> SCRUM la comunicación entre los miembros del equipo es bastante importante. Si bien probablemente no hagamos reuniones diarias (</a:t>
+            </a:r>
+            <a:r>
+              <a:rPr lang="es-AR" b="0" baseline="0" dirty="0" err="1" smtClean="0"/>
+              <a:t>Daily</a:t>
+            </a:r>
+            <a:r>
+              <a:rPr lang="es-AR" b="0" baseline="0" dirty="0" smtClean="0"/>
+              <a:t> </a:t>
+            </a:r>
+            <a:r>
+              <a:rPr lang="es-AR" b="0" baseline="0" dirty="0" err="1" smtClean="0"/>
+              <a:t>Scrums</a:t>
+            </a:r>
+            <a:r>
+              <a:rPr lang="es-AR" b="0" baseline="0" dirty="0" smtClean="0"/>
+              <a:t>), al menos nos podemos mantener comunicados constantemente a través de mails y manteniendo los </a:t>
+            </a:r>
+            <a:r>
+              <a:rPr lang="es-AR" b="0" baseline="0" dirty="0" err="1" smtClean="0"/>
+              <a:t>backlogs</a:t>
+            </a:r>
+            <a:r>
+              <a:rPr lang="es-AR" b="0" baseline="0" dirty="0" smtClean="0"/>
+              <a:t> siempre actualizados en el Sistema. </a:t>
+            </a:r>
+          </a:p>
+          <a:p>
+            <a:pPr>
+              <a:buFont typeface="Arial" pitchFamily="34" charset="0"/>
+              <a:buChar char="•"/>
+            </a:pPr>
+            <a:r>
+              <a:rPr lang="es-AR" b="0" baseline="0" dirty="0" smtClean="0"/>
+              <a:t>Además de esto mantendremos reuniones semanales entre equipo (</a:t>
+            </a:r>
+            <a:r>
+              <a:rPr lang="es-AR" b="0" baseline="0" dirty="0" err="1" smtClean="0"/>
+              <a:t>Planning-Review</a:t>
+            </a:r>
+            <a:r>
+              <a:rPr lang="es-AR" b="0" baseline="0" dirty="0" smtClean="0"/>
+              <a:t>) y con el cliente, usando el </a:t>
+            </a:r>
+            <a:r>
+              <a:rPr lang="es-AR" b="0" baseline="0" dirty="0" err="1" smtClean="0"/>
+              <a:t>Backlog</a:t>
+            </a:r>
+            <a:r>
+              <a:rPr lang="es-AR" b="0" baseline="0" dirty="0" smtClean="0"/>
+              <a:t> como reporte de avance. Todo lo que se hable en estas reuniones deberá quedar asentado en las minutas de reunión.</a:t>
+            </a:r>
+            <a:endParaRPr lang="es-AR" b="0" dirty="0" smtClean="0"/>
+          </a:p>
+          <a:p>
             <a:pPr eaLnBrk="1" hangingPunct="1"/>
-            <a:endParaRPr lang="es-AR" smtClean="0"/>
+            <a:endParaRPr lang="es-AR" dirty="0" smtClean="0"/>
           </a:p>
         </p:txBody>
       </p:sp>
@@ -1483,7 +1840,22 @@
           <a:lstStyle/>
           <a:p>
             <a:pPr eaLnBrk="1" hangingPunct="1"/>
-            <a:endParaRPr lang="es-AR" smtClean="0"/>
+            <a:r>
+              <a:rPr lang="es-AR" dirty="0" smtClean="0"/>
+              <a:t>Speaker:</a:t>
+            </a:r>
+            <a:r>
+              <a:rPr lang="es-AR" baseline="0" dirty="0" smtClean="0"/>
+              <a:t> </a:t>
+            </a:r>
+          </a:p>
+          <a:p>
+            <a:pPr eaLnBrk="1" hangingPunct="1"/>
+            <a:endParaRPr lang="es-AR" baseline="0" dirty="0" smtClean="0"/>
+          </a:p>
+          <a:p>
+            <a:pPr eaLnBrk="1" hangingPunct="1"/>
+            <a:endParaRPr lang="es-AR" dirty="0" smtClean="0"/>
           </a:p>
         </p:txBody>
       </p:sp>
@@ -1571,7 +1943,22 @@
           <a:lstStyle/>
           <a:p>
             <a:pPr eaLnBrk="1" hangingPunct="1"/>
-            <a:endParaRPr lang="es-AR" smtClean="0"/>
+            <a:r>
+              <a:rPr lang="es-AR" dirty="0" smtClean="0"/>
+              <a:t>Speaker:</a:t>
+            </a:r>
+            <a:r>
+              <a:rPr lang="es-AR" baseline="0" dirty="0" smtClean="0"/>
+              <a:t> </a:t>
+            </a:r>
+          </a:p>
+          <a:p>
+            <a:pPr eaLnBrk="1" hangingPunct="1"/>
+            <a:endParaRPr lang="es-AR" baseline="0" dirty="0" smtClean="0"/>
+          </a:p>
+          <a:p>
+            <a:pPr eaLnBrk="1" hangingPunct="1"/>
+            <a:endParaRPr lang="es-AR" dirty="0" smtClean="0"/>
           </a:p>
         </p:txBody>
       </p:sp>
@@ -1659,7 +2046,61 @@
           <a:lstStyle/>
           <a:p>
             <a:pPr eaLnBrk="1" hangingPunct="1"/>
-            <a:endParaRPr lang="es-AR" smtClean="0"/>
+            <a:r>
+              <a:rPr lang="es-AR" dirty="0" smtClean="0"/>
+              <a:t>Speaker:</a:t>
+            </a:r>
+            <a:r>
+              <a:rPr lang="es-AR" baseline="0" dirty="0" smtClean="0"/>
+              <a:t> </a:t>
+            </a:r>
+          </a:p>
+          <a:p>
+            <a:pPr eaLnBrk="1" hangingPunct="1"/>
+            <a:endParaRPr lang="es-AR" baseline="0" dirty="0" smtClean="0"/>
+          </a:p>
+          <a:p>
+            <a:pPr>
+              <a:buFont typeface="Arial" pitchFamily="34" charset="0"/>
+              <a:buChar char="•"/>
+            </a:pPr>
+            <a:r>
+              <a:rPr lang="es-ES_tradnl" baseline="0" dirty="0" smtClean="0"/>
+              <a:t> Criterios de aceptación interna: vamos a buscar un 70% de cobertura en las pruebas unitarias, y en las pruebas cruzadas, la aceptación del compañero, que va a utilizar el correspondiente </a:t>
+            </a:r>
+            <a:r>
+              <a:rPr lang="es-ES_tradnl" baseline="0" dirty="0" err="1" smtClean="0"/>
+              <a:t>user</a:t>
+            </a:r>
+            <a:r>
+              <a:rPr lang="es-ES_tradnl" baseline="0" dirty="0" smtClean="0"/>
+              <a:t> </a:t>
+            </a:r>
+            <a:r>
+              <a:rPr lang="es-ES_tradnl" baseline="0" dirty="0" err="1" smtClean="0"/>
+              <a:t>story</a:t>
+            </a:r>
+            <a:r>
+              <a:rPr lang="es-ES_tradnl" baseline="0" dirty="0" smtClean="0"/>
+              <a:t> para comprobar el funcionamiento.</a:t>
+            </a:r>
+          </a:p>
+          <a:p>
+            <a:pPr>
+              <a:buFont typeface="Arial" pitchFamily="34" charset="0"/>
+              <a:buChar char="•"/>
+            </a:pPr>
+            <a:r>
+              <a:rPr lang="es-ES_tradnl" baseline="0" dirty="0" smtClean="0"/>
+              <a:t> Las pruebas de integración se van a realizar siempre antes de la finalización de cada sprint, juntarnos todos y probar todos juntos la aplicación.</a:t>
+            </a:r>
+          </a:p>
+          <a:p>
+            <a:pPr>
+              <a:buFont typeface="Arial" pitchFamily="34" charset="0"/>
+              <a:buNone/>
+            </a:pPr>
+            <a:endParaRPr lang="es-AR" dirty="0" smtClean="0"/>
           </a:p>
         </p:txBody>
       </p:sp>
@@ -1747,7 +2188,22 @@
           <a:lstStyle/>
           <a:p>
             <a:pPr eaLnBrk="1" hangingPunct="1"/>
-            <a:endParaRPr lang="es-AR" smtClean="0"/>
+            <a:r>
+              <a:rPr lang="es-AR" dirty="0" smtClean="0"/>
+              <a:t>Speaker:</a:t>
+            </a:r>
+            <a:r>
+              <a:rPr lang="es-AR" baseline="0" dirty="0" smtClean="0"/>
+              <a:t> </a:t>
+            </a:r>
+          </a:p>
+          <a:p>
+            <a:pPr eaLnBrk="1" hangingPunct="1"/>
+            <a:endParaRPr lang="es-AR" baseline="0" dirty="0" smtClean="0"/>
+          </a:p>
+          <a:p>
+            <a:pPr eaLnBrk="1" hangingPunct="1"/>
+            <a:endParaRPr lang="es-AR" dirty="0" smtClean="0"/>
           </a:p>
         </p:txBody>
       </p:sp>
@@ -1835,7 +2291,30 @@
           <a:lstStyle/>
           <a:p>
             <a:pPr eaLnBrk="1" hangingPunct="1"/>
-            <a:endParaRPr lang="es-AR" smtClean="0"/>
+            <a:r>
+              <a:rPr lang="es-AR" dirty="0" smtClean="0"/>
+              <a:t>Speaker:</a:t>
+            </a:r>
+            <a:r>
+              <a:rPr lang="es-AR" baseline="0" dirty="0" smtClean="0"/>
+              <a:t> </a:t>
+            </a:r>
+          </a:p>
+          <a:p>
+            <a:pPr eaLnBrk="1" hangingPunct="1"/>
+            <a:endParaRPr lang="es-AR" baseline="0" dirty="0" smtClean="0"/>
+          </a:p>
+          <a:p>
+            <a:pPr eaLnBrk="1" hangingPunct="1"/>
+            <a:r>
+              <a:rPr lang="es-AR" dirty="0" smtClean="0"/>
+              <a:t>Utilizaremos</a:t>
+            </a:r>
+            <a:r>
+              <a:rPr lang="es-AR" baseline="0" dirty="0" smtClean="0"/>
+              <a:t> etiquetas, links y otras herramientas del sistema para realizar la trazabilidad</a:t>
+            </a:r>
+            <a:endParaRPr lang="es-AR" dirty="0" smtClean="0"/>
           </a:p>
         </p:txBody>
       </p:sp>
@@ -1922,20 +2401,111 @@
           <a:bodyPr/>
           <a:lstStyle/>
           <a:p>
+            <a:pPr marL="0" marR="0" lvl="0" indent="0" algn="l" defTabSz="914400" rtl="0" eaLnBrk="1" fontAlgn="base" latinLnBrk="0" hangingPunct="1">
+              <a:lnSpc>
+                <a:spcPct val="80000"/>
+              </a:lnSpc>
+              <a:spcBef>
+                <a:spcPct val="30000"/>
+              </a:spcBef>
+              <a:spcAft>
+                <a:spcPct val="0"/>
+              </a:spcAft>
+              <a:buClrTx/>
+              <a:buSzTx/>
+              <a:buFontTx/>
+              <a:buNone/>
+              <a:tabLst/>
+              <a:defRPr/>
+            </a:pPr>
+            <a:r>
+              <a:rPr lang="es-AR" sz="2000" dirty="0" smtClean="0"/>
+              <a:t>Speaker:</a:t>
+            </a:r>
+            <a:r>
+              <a:rPr lang="es-AR" sz="2000" baseline="0" dirty="0" smtClean="0"/>
+              <a:t> </a:t>
+            </a:r>
+            <a:endParaRPr lang="es-AR" sz="2000" dirty="0" smtClean="0"/>
+          </a:p>
+          <a:p>
+            <a:pPr marL="0" marR="0" lvl="0" indent="0" algn="l" defTabSz="914400" rtl="0" eaLnBrk="1" fontAlgn="base" latinLnBrk="0" hangingPunct="1">
+              <a:lnSpc>
+                <a:spcPct val="80000"/>
+              </a:lnSpc>
+              <a:spcBef>
+                <a:spcPct val="30000"/>
+              </a:spcBef>
+              <a:spcAft>
+                <a:spcPct val="0"/>
+              </a:spcAft>
+              <a:buClrTx/>
+              <a:buSzTx/>
+              <a:buFontTx/>
+              <a:buNone/>
+              <a:tabLst/>
+              <a:defRPr/>
+            </a:pPr>
+            <a:endParaRPr lang="es-AR" sz="2000" dirty="0" smtClean="0"/>
+          </a:p>
+          <a:p>
+            <a:pPr marL="0" marR="0" lvl="0" indent="0" algn="l" defTabSz="914400" rtl="0" eaLnBrk="1" fontAlgn="base" latinLnBrk="0" hangingPunct="1">
+              <a:lnSpc>
+                <a:spcPct val="80000"/>
+              </a:lnSpc>
+              <a:spcBef>
+                <a:spcPct val="30000"/>
+              </a:spcBef>
+              <a:spcAft>
+                <a:spcPct val="0"/>
+              </a:spcAft>
+              <a:buClrTx/>
+              <a:buSzTx/>
+              <a:buFontTx/>
+              <a:buNone/>
+              <a:tabLst/>
+              <a:defRPr/>
+            </a:pPr>
+            <a:r>
+              <a:rPr lang="es-AR" sz="2000" dirty="0" smtClean="0"/>
+              <a:t>La metodología que vamos a usar es SCRUM. </a:t>
+            </a:r>
+            <a:endParaRPr lang="es-ES" sz="1900" dirty="0" smtClean="0"/>
+          </a:p>
+          <a:p>
+            <a:pPr lvl="0" eaLnBrk="1" hangingPunct="1">
+              <a:lnSpc>
+                <a:spcPct val="80000"/>
+              </a:lnSpc>
+            </a:pPr>
+            <a:r>
+              <a:rPr lang="es-ES" sz="1900" dirty="0" smtClean="0"/>
+              <a:t>Por que </a:t>
+            </a:r>
+            <a:r>
+              <a:rPr lang="es-ES" sz="1900" dirty="0" err="1" smtClean="0"/>
+              <a:t>Scrum</a:t>
+            </a:r>
+            <a:r>
+              <a:rPr lang="es-ES" sz="1900" dirty="0" smtClean="0"/>
+              <a:t>?</a:t>
+            </a:r>
+          </a:p>
+          <a:p>
             <a:pPr lvl="1" eaLnBrk="1" hangingPunct="1">
               <a:lnSpc>
                 <a:spcPct val="80000"/>
               </a:lnSpc>
             </a:pPr>
             <a:r>
-              <a:rPr lang="es-ES" sz="1900" smtClean="0"/>
+              <a:rPr lang="es-ES" sz="1900" dirty="0" smtClean="0"/>
               <a:t>Proceso </a:t>
             </a:r>
             <a:r>
-              <a:rPr lang="es-AR" sz="1900" smtClean="0"/>
+              <a:rPr lang="es-AR" sz="1900" dirty="0" smtClean="0"/>
               <a:t>ágil</a:t>
             </a:r>
-            <a:endParaRPr lang="es-ES" sz="1900" smtClean="0"/>
+            <a:endParaRPr lang="es-ES" sz="1900" dirty="0" smtClean="0"/>
           </a:p>
           <a:p>
             <a:pPr lvl="1" eaLnBrk="1" hangingPunct="1">
@@ -1944,8 +2514,24 @@
               </a:lnSpc>
             </a:pPr>
             <a:r>
-              <a:rPr lang="es-ES" sz="1900" smtClean="0"/>
-              <a:t>Iteraciones cortas (Sprints, de dos semanas en nuestro caso)</a:t>
+              <a:rPr lang="es-ES" sz="1900" dirty="0" smtClean="0"/>
+              <a:t>Iteraciones </a:t>
+            </a:r>
+            <a:r>
+              <a:rPr lang="es-ES" sz="1900" dirty="0" smtClean="0"/>
+              <a:t>cortas (</a:t>
+            </a:r>
+            <a:r>
+              <a:rPr lang="es-ES" sz="1900" dirty="0" err="1" smtClean="0"/>
+              <a:t>Sprints</a:t>
+            </a:r>
+            <a:r>
+              <a:rPr lang="es-ES" sz="1900" dirty="0" smtClean="0"/>
+              <a:t>, de dos semanas en nuestro </a:t>
+            </a:r>
+            <a:r>
+              <a:rPr lang="es-ES" sz="1900" dirty="0" smtClean="0"/>
+              <a:t>caso)</a:t>
             </a:r>
           </a:p>
           <a:p>
@@ -1955,7 +2541,7 @@
               </a:lnSpc>
             </a:pPr>
             <a:r>
-              <a:rPr lang="es-ES" sz="1900" smtClean="0"/>
+              <a:rPr lang="es-ES" sz="1900" dirty="0" smtClean="0"/>
               <a:t>Equipos auto-organizados</a:t>
             </a:r>
           </a:p>
@@ -1966,8 +2552,51 @@
               </a:lnSpc>
             </a:pPr>
             <a:r>
-              <a:rPr lang="es-ES" sz="1900" smtClean="0"/>
-              <a:t>Permite inspeccionar/mostrar software real en forma rápida y en repetidas ocasiones</a:t>
+              <a:rPr lang="es-ES" sz="1900" dirty="0" smtClean="0"/>
+              <a:t>Permite </a:t>
+            </a:r>
+            <a:r>
+              <a:rPr lang="es-ES" sz="1900" dirty="0" smtClean="0"/>
+              <a:t>inspeccionar/mostrar software real en forma rápida y en repetidas </a:t>
+            </a:r>
+            <a:r>
+              <a:rPr lang="es-ES" sz="1900" dirty="0" smtClean="0"/>
+              <a:t>ocasiones</a:t>
+            </a:r>
+          </a:p>
+          <a:p>
+            <a:pPr marL="457200" marR="0" lvl="1" indent="0" algn="l" defTabSz="914400" rtl="0" eaLnBrk="1" fontAlgn="base" latinLnBrk="0" hangingPunct="1">
+              <a:lnSpc>
+                <a:spcPct val="80000"/>
+              </a:lnSpc>
+              <a:spcBef>
+                <a:spcPct val="30000"/>
+              </a:spcBef>
+              <a:spcAft>
+                <a:spcPct val="0"/>
+              </a:spcAft>
+              <a:buClrTx/>
+              <a:buSzTx/>
+              <a:buFontTx/>
+              <a:buNone/>
+              <a:tabLst/>
+              <a:defRPr/>
+            </a:pPr>
+            <a:r>
+              <a:rPr lang="es-ES" sz="1900" dirty="0" smtClean="0"/>
+              <a:t>Experiencia de algunos integrantes del equipo</a:t>
+            </a:r>
+            <a:endParaRPr lang="es-ES" sz="1900" dirty="0" smtClean="0"/>
+          </a:p>
+          <a:p>
+            <a:pPr lvl="0" eaLnBrk="1" hangingPunct="1">
+              <a:lnSpc>
+                <a:spcPct val="80000"/>
+              </a:lnSpc>
+            </a:pPr>
+            <a:r>
+              <a:rPr lang="es-ES" sz="1900" dirty="0" smtClean="0"/>
+              <a:t>Desarrollo superpuesto</a:t>
             </a:r>
           </a:p>
           <a:p>
@@ -1977,57 +2606,14 @@
               </a:lnSpc>
             </a:pPr>
             <a:r>
-              <a:rPr lang="es-ES" sz="1900" smtClean="0"/>
-              <a:t>Desarrollo superpuesto</a:t>
-            </a:r>
-          </a:p>
-          <a:p>
-            <a:pPr lvl="2" eaLnBrk="1" hangingPunct="1">
-              <a:lnSpc>
-                <a:spcPct val="80000"/>
-              </a:lnSpc>
-            </a:pPr>
-            <a:r>
-              <a:rPr lang="es-ES" sz="1900" smtClean="0"/>
-              <a:t>El producto es diseñado, codificado y testeado en cada sprint</a:t>
-            </a:r>
-          </a:p>
-          <a:p>
-            <a:pPr lvl="1" eaLnBrk="1" hangingPunct="1">
-              <a:lnSpc>
-                <a:spcPct val="80000"/>
-              </a:lnSpc>
-            </a:pPr>
-            <a:r>
-              <a:rPr lang="es-ES" sz="1900" smtClean="0"/>
-              <a:t>Product backlog: lista actualizada de requesitos</a:t>
-            </a:r>
-          </a:p>
-          <a:p>
-            <a:pPr lvl="1" eaLnBrk="1" hangingPunct="1">
-              <a:lnSpc>
-                <a:spcPct val="80000"/>
-              </a:lnSpc>
-            </a:pPr>
-            <a:r>
-              <a:rPr lang="es-ES" sz="1900" smtClean="0"/>
-              <a:t>Sprint backlog: requisitos a cumplir en el sprint actual</a:t>
-            </a:r>
-          </a:p>
-          <a:p>
-            <a:pPr lvl="1" eaLnBrk="1" hangingPunct="1">
-              <a:lnSpc>
-                <a:spcPct val="80000"/>
-              </a:lnSpc>
-            </a:pPr>
-            <a:r>
-              <a:rPr lang="es-ES" sz="1900" smtClean="0"/>
-              <a:t>Experiencia de algunos integrantes del equipo</a:t>
-            </a:r>
-          </a:p>
-          <a:p>
-            <a:pPr eaLnBrk="1" hangingPunct="1"/>
-            <a:endParaRPr lang="es-AR" smtClean="0"/>
+              <a:rPr lang="es-ES" sz="1900" dirty="0" smtClean="0"/>
+              <a:t>El producto es diseñado, codificado y testeado en cada </a:t>
+            </a:r>
+            <a:r>
+              <a:rPr lang="es-ES" sz="1900" dirty="0" smtClean="0"/>
+              <a:t>sprint</a:t>
+            </a:r>
+            <a:endParaRPr lang="es-ES" sz="1900" dirty="0" smtClean="0"/>
           </a:p>
         </p:txBody>
       </p:sp>
@@ -2058,7 +2644,7 @@
       </p:grpSpPr>
       <p:sp>
         <p:nvSpPr>
-          <p:cNvPr id="44034" name="Rectangle 7"/>
+          <p:cNvPr id="45058" name="Rectangle 7"/>
           <p:cNvSpPr>
             <a:spLocks noGrp="1" noChangeArrowheads="1"/>
           </p:cNvSpPr>
@@ -2073,7 +2659,7 @@
           <a:bodyPr/>
           <a:lstStyle/>
           <a:p>
-            <a:fld id="{D9234D06-4B3E-4649-8770-4AC86EB469B1}" type="slidenum">
+            <a:fld id="{3015865A-BE62-43A7-B93C-CE2BE49D489C}" type="slidenum">
               <a:rPr lang="es-ES" smtClean="0"/>
               <a:pPr/>
               <a:t>20</a:t>
@@ -2084,7 +2670,7 @@
       </p:sp>
       <p:sp>
         <p:nvSpPr>
-          <p:cNvPr id="44035" name="Rectangle 2"/>
+          <p:cNvPr id="45059" name="Rectangle 2"/>
           <p:cNvSpPr>
             <a:spLocks noGrp="1" noRot="1" noChangeAspect="1" noChangeArrowheads="1" noTextEdit="1"/>
           </p:cNvSpPr>
@@ -2098,7 +2684,7 @@
       </p:sp>
       <p:sp>
         <p:nvSpPr>
-          <p:cNvPr id="44036" name="Rectangle 3"/>
+          <p:cNvPr id="45060" name="Rectangle 3"/>
           <p:cNvSpPr>
             <a:spLocks noGrp="1" noChangeArrowheads="1"/>
           </p:cNvSpPr>
@@ -2115,7 +2701,22 @@
           <a:lstStyle/>
           <a:p>
             <a:pPr eaLnBrk="1" hangingPunct="1"/>
-            <a:endParaRPr lang="es-AR" smtClean="0"/>
+            <a:r>
+              <a:rPr lang="es-AR" dirty="0" smtClean="0"/>
+              <a:t>Speaker:</a:t>
+            </a:r>
+            <a:r>
+              <a:rPr lang="es-AR" baseline="0" dirty="0" smtClean="0"/>
+              <a:t> </a:t>
+            </a:r>
+          </a:p>
+          <a:p>
+            <a:pPr eaLnBrk="1" hangingPunct="1"/>
+            <a:endParaRPr lang="es-AR" baseline="0" dirty="0" smtClean="0"/>
+          </a:p>
+          <a:p>
+            <a:pPr eaLnBrk="1" hangingPunct="1"/>
+            <a:endParaRPr lang="es-AR" dirty="0" smtClean="0"/>
           </a:p>
         </p:txBody>
       </p:sp>
@@ -2146,7 +2747,7 @@
       </p:grpSpPr>
       <p:sp>
         <p:nvSpPr>
-          <p:cNvPr id="45058" name="Rectangle 7"/>
+          <p:cNvPr id="46082" name="Rectangle 7"/>
           <p:cNvSpPr>
             <a:spLocks noGrp="1" noChangeArrowheads="1"/>
           </p:cNvSpPr>
@@ -2161,7 +2762,7 @@
           <a:bodyPr/>
           <a:lstStyle/>
           <a:p>
-            <a:fld id="{3015865A-BE62-43A7-B93C-CE2BE49D489C}" type="slidenum">
+            <a:fld id="{A3187E7A-E511-4379-9674-CA84A8369CCC}" type="slidenum">
               <a:rPr lang="es-ES" smtClean="0"/>
               <a:pPr/>
               <a:t>21</a:t>
@@ -2172,7 +2773,7 @@
       </p:sp>
       <p:sp>
         <p:nvSpPr>
-          <p:cNvPr id="45059" name="Rectangle 2"/>
+          <p:cNvPr id="46083" name="Rectangle 2"/>
           <p:cNvSpPr>
             <a:spLocks noGrp="1" noRot="1" noChangeAspect="1" noChangeArrowheads="1" noTextEdit="1"/>
           </p:cNvSpPr>
@@ -2186,7 +2787,7 @@
       </p:sp>
       <p:sp>
         <p:nvSpPr>
-          <p:cNvPr id="45060" name="Rectangle 3"/>
+          <p:cNvPr id="46084" name="Rectangle 3"/>
           <p:cNvSpPr>
             <a:spLocks noGrp="1" noChangeArrowheads="1"/>
           </p:cNvSpPr>
@@ -2203,7 +2804,18 @@
           <a:lstStyle/>
           <a:p>
             <a:pPr eaLnBrk="1" hangingPunct="1"/>
-            <a:endParaRPr lang="es-AR" smtClean="0"/>
+            <a:r>
+              <a:rPr lang="es-AR" dirty="0" smtClean="0"/>
+              <a:t>Speaker:</a:t>
+            </a:r>
+          </a:p>
+          <a:p>
+            <a:pPr eaLnBrk="1" hangingPunct="1"/>
+            <a:endParaRPr lang="es-AR" dirty="0" smtClean="0"/>
+          </a:p>
+          <a:p>
+            <a:pPr eaLnBrk="1" hangingPunct="1"/>
+            <a:endParaRPr lang="es-AR" dirty="0" smtClean="0"/>
           </a:p>
         </p:txBody>
       </p:sp>
@@ -2234,7 +2846,7 @@
       </p:grpSpPr>
       <p:sp>
         <p:nvSpPr>
-          <p:cNvPr id="46082" name="Rectangle 7"/>
+          <p:cNvPr id="47106" name="Rectangle 7"/>
           <p:cNvSpPr>
             <a:spLocks noGrp="1" noChangeArrowheads="1"/>
           </p:cNvSpPr>
@@ -2249,7 +2861,7 @@
           <a:bodyPr/>
           <a:lstStyle/>
           <a:p>
-            <a:fld id="{A3187E7A-E511-4379-9674-CA84A8369CCC}" type="slidenum">
+            <a:fld id="{060F6942-349D-437D-B6CE-AF49DFD3E8BD}" type="slidenum">
               <a:rPr lang="es-ES" smtClean="0"/>
               <a:pPr/>
               <a:t>22</a:t>
@@ -2260,7 +2872,7 @@
       </p:sp>
       <p:sp>
         <p:nvSpPr>
-          <p:cNvPr id="46083" name="Rectangle 2"/>
+          <p:cNvPr id="47107" name="Rectangle 2"/>
           <p:cNvSpPr>
             <a:spLocks noGrp="1" noRot="1" noChangeAspect="1" noChangeArrowheads="1" noTextEdit="1"/>
           </p:cNvSpPr>
@@ -2274,7 +2886,7 @@
       </p:sp>
       <p:sp>
         <p:nvSpPr>
-          <p:cNvPr id="46084" name="Rectangle 3"/>
+          <p:cNvPr id="47108" name="Rectangle 3"/>
           <p:cNvSpPr>
             <a:spLocks noGrp="1" noChangeArrowheads="1"/>
           </p:cNvSpPr>
@@ -2291,7 +2903,22 @@
           <a:lstStyle/>
           <a:p>
             <a:pPr eaLnBrk="1" hangingPunct="1"/>
-            <a:endParaRPr lang="es-AR" smtClean="0"/>
+            <a:r>
+              <a:rPr lang="es-AR" dirty="0" smtClean="0"/>
+              <a:t>Speaker:</a:t>
+            </a:r>
+            <a:r>
+              <a:rPr lang="es-AR" baseline="0" dirty="0" smtClean="0"/>
+              <a:t> </a:t>
+            </a:r>
+          </a:p>
+          <a:p>
+            <a:pPr eaLnBrk="1" hangingPunct="1"/>
+            <a:endParaRPr lang="es-AR" baseline="0" dirty="0" smtClean="0"/>
+          </a:p>
+          <a:p>
+            <a:pPr eaLnBrk="1" hangingPunct="1"/>
+            <a:endParaRPr lang="es-AR" dirty="0" smtClean="0"/>
           </a:p>
         </p:txBody>
       </p:sp>
@@ -2322,7 +2949,7 @@
       </p:grpSpPr>
       <p:sp>
         <p:nvSpPr>
-          <p:cNvPr id="47106" name="Rectangle 7"/>
+          <p:cNvPr id="48130" name="Rectangle 7"/>
           <p:cNvSpPr>
             <a:spLocks noGrp="1" noChangeArrowheads="1"/>
           </p:cNvSpPr>
@@ -2337,7 +2964,7 @@
           <a:bodyPr/>
           <a:lstStyle/>
           <a:p>
-            <a:fld id="{060F6942-349D-437D-B6CE-AF49DFD3E8BD}" type="slidenum">
+            <a:fld id="{4D183F08-FBD3-4A86-BA7F-79516DB782E6}" type="slidenum">
               <a:rPr lang="es-ES" smtClean="0"/>
               <a:pPr/>
               <a:t>23</a:t>
@@ -2348,7 +2975,7 @@
       </p:sp>
       <p:sp>
         <p:nvSpPr>
-          <p:cNvPr id="47107" name="Rectangle 2"/>
+          <p:cNvPr id="48131" name="Rectangle 2"/>
           <p:cNvSpPr>
             <a:spLocks noGrp="1" noRot="1" noChangeAspect="1" noChangeArrowheads="1" noTextEdit="1"/>
           </p:cNvSpPr>
@@ -2362,7 +2989,7 @@
       </p:sp>
       <p:sp>
         <p:nvSpPr>
-          <p:cNvPr id="47108" name="Rectangle 3"/>
+          <p:cNvPr id="48132" name="Rectangle 3"/>
           <p:cNvSpPr>
             <a:spLocks noGrp="1" noChangeArrowheads="1"/>
           </p:cNvSpPr>
@@ -2479,94 +3106,6 @@
 </p:notes>
 </file>
 
-<file path=ppt/notesSlides/notesSlide25.xml><?xml version="1.0" encoding="utf-8"?>
-<p:notes xmlns:a="http://schemas.openxmlformats.org/drawingml/2006/main" xmlns:r="http://schemas.openxmlformats.org/officeDocument/2006/relationships" xmlns:p="http://schemas.openxmlformats.org/presentationml/2006/main">
-  <p:cSld>
-    <p:spTree>
-      <p:nvGrpSpPr>
-        <p:cNvPr id="1" name=""/>
-        <p:cNvGrpSpPr/>
-        <p:nvPr/>
-      </p:nvGrpSpPr>
-      <p:grpSpPr>
-        <a:xfrm>
-          <a:off x="0" y="0"/>
-          <a:ext cx="0" cy="0"/>
-          <a:chOff x="0" y="0"/>
-          <a:chExt cx="0" cy="0"/>
-        </a:xfrm>
-      </p:grpSpPr>
-      <p:sp>
-        <p:nvSpPr>
-          <p:cNvPr id="48130" name="Rectangle 7"/>
-          <p:cNvSpPr>
-            <a:spLocks noGrp="1" noChangeArrowheads="1"/>
-          </p:cNvSpPr>
-          <p:nvPr>
-            <p:ph type="sldNum" sz="quarter" idx="5"/>
-          </p:nvPr>
-        </p:nvSpPr>
-        <p:spPr>
-          <a:noFill/>
-        </p:spPr>
-        <p:txBody>
-          <a:bodyPr/>
-          <a:lstStyle/>
-          <a:p>
-            <a:fld id="{4D183F08-FBD3-4A86-BA7F-79516DB782E6}" type="slidenum">
-              <a:rPr lang="es-ES" smtClean="0"/>
-              <a:pPr/>
-              <a:t>25</a:t>
-            </a:fld>
-            <a:endParaRPr lang="es-ES" smtClean="0"/>
-          </a:p>
-        </p:txBody>
-      </p:sp>
-      <p:sp>
-        <p:nvSpPr>
-          <p:cNvPr id="48131" name="Rectangle 2"/>
-          <p:cNvSpPr>
-            <a:spLocks noGrp="1" noRot="1" noChangeAspect="1" noChangeArrowheads="1" noTextEdit="1"/>
-          </p:cNvSpPr>
-          <p:nvPr>
-            <p:ph type="sldImg"/>
-          </p:nvPr>
-        </p:nvSpPr>
-        <p:spPr>
-          <a:ln cap="flat"/>
-        </p:spPr>
-      </p:sp>
-      <p:sp>
-        <p:nvSpPr>
-          <p:cNvPr id="48132" name="Rectangle 3"/>
-          <p:cNvSpPr>
-            <a:spLocks noGrp="1" noChangeArrowheads="1"/>
-          </p:cNvSpPr>
-          <p:nvPr>
-            <p:ph type="body" idx="1"/>
-          </p:nvPr>
-        </p:nvSpPr>
-        <p:spPr>
-          <a:noFill/>
-          <a:ln/>
-        </p:spPr>
-        <p:txBody>
-          <a:bodyPr/>
-          <a:lstStyle/>
-          <a:p>
-            <a:pPr eaLnBrk="1" hangingPunct="1"/>
-            <a:endParaRPr lang="es-AR" smtClean="0"/>
-          </a:p>
-        </p:txBody>
-      </p:sp>
-    </p:spTree>
-  </p:cSld>
-  <p:clrMapOvr>
-    <a:masterClrMapping/>
-  </p:clrMapOvr>
-</p:notes>
-</file>
-
 <file path=ppt/notesSlides/notesSlide3.xml><?xml version="1.0" encoding="utf-8"?>
 <p:notes xmlns:a="http://schemas.openxmlformats.org/drawingml/2006/main" xmlns:r="http://schemas.openxmlformats.org/officeDocument/2006/relationships" xmlns:p="http://schemas.openxmlformats.org/presentationml/2006/main">
   <p:cSld>
@@ -2643,38 +3182,152 @@
           <a:lstStyle/>
           <a:p>
             <a:r>
-              <a:rPr lang="es-AR" smtClean="0"/>
-              <a:t>La metodología que vamos a usar es SCRUM. </a:t>
-            </a:r>
-            <a:endParaRPr lang="es-AR" b="1" smtClean="0"/>
-          </a:p>
-          <a:p>
-            <a:r>
-              <a:rPr lang="es-AR" smtClean="0"/>
-              <a:t>En esta metodología, catalogada dentro de las metodologias agiles, el proyecto se divide en iteraciones, llamadas sprints, y en cada iteración se crea un incremento entregable del producto. Cada iteración generalmente es de 1 a 4 semanas.</a:t>
-            </a:r>
-          </a:p>
-          <a:p>
-            <a:r>
-              <a:rPr lang="es-AR" smtClean="0"/>
-              <a:t>Los requisitos se mantienen en una lista priorizada llamada Product Backlog, el equipo al iniciar cada iteración (en la reunión de Sprint Planning), el equipo toma del sprint backlog la cantidad de trabajo a la que se puede comprometer a terminar. El equipo trabaja durante el sprint, reuniéndose diariamente para revisar el estado del sprint backlog y presenta los resultados al cliente al final del sprint en la reunión Sprint Review.</a:t>
-            </a:r>
-          </a:p>
-          <a:p>
-            <a:r>
-              <a:rPr lang="es-AR" smtClean="0"/>
-              <a:t>En SCRUM es importante la participación del cliente para dar feedback el final de cada iteración y asegurarse de que lo que se esta construyendo es lo que el quiere.</a:t>
-            </a:r>
-          </a:p>
-          <a:p>
-            <a:r>
-              <a:rPr lang="es-AR" smtClean="0"/>
+              <a:rPr lang="es-AR" dirty="0" smtClean="0"/>
+              <a:t>Speaker:</a:t>
+            </a:r>
+            <a:r>
+              <a:rPr lang="es-AR" baseline="0" dirty="0" smtClean="0"/>
+              <a:t> </a:t>
+            </a:r>
+          </a:p>
+          <a:p>
+            <a:endParaRPr lang="es-AR" dirty="0" smtClean="0"/>
+          </a:p>
+          <a:p>
+            <a:r>
+              <a:rPr lang="es-AR" dirty="0" smtClean="0"/>
+              <a:t>Comentamos brevemente en que</a:t>
+            </a:r>
+            <a:r>
+              <a:rPr lang="es-AR" baseline="0" dirty="0" smtClean="0"/>
+              <a:t> consiste </a:t>
+            </a:r>
+            <a:r>
+              <a:rPr lang="es-AR" baseline="0" dirty="0" err="1" smtClean="0"/>
+              <a:t>Scrum</a:t>
+            </a:r>
+            <a:r>
+              <a:rPr lang="es-AR" baseline="0" dirty="0" smtClean="0"/>
+              <a:t>. </a:t>
+            </a:r>
+            <a:r>
+              <a:rPr lang="es-AR" dirty="0" smtClean="0"/>
+              <a:t>En </a:t>
+            </a:r>
+            <a:r>
+              <a:rPr lang="es-AR" dirty="0" smtClean="0"/>
+              <a:t>esta metodología, catalogada dentro de las </a:t>
+            </a:r>
+            <a:r>
+              <a:rPr lang="es-AR" dirty="0" err="1" smtClean="0"/>
+              <a:t>metodologias</a:t>
+            </a:r>
+            <a:r>
+              <a:rPr lang="es-AR" dirty="0" smtClean="0"/>
+              <a:t> agiles, el proyecto se divide en iteraciones, llamadas </a:t>
+            </a:r>
+            <a:r>
+              <a:rPr lang="es-AR" dirty="0" err="1" smtClean="0"/>
+              <a:t>sprints</a:t>
+            </a:r>
+            <a:r>
+              <a:rPr lang="es-AR" dirty="0" smtClean="0"/>
+              <a:t>, y en cada iteración se crea un incremento entregable del producto. Cada iteración generalmente es de 1 a 4 semanas.</a:t>
+            </a:r>
+          </a:p>
+          <a:p>
+            <a:r>
+              <a:rPr lang="es-AR" dirty="0" smtClean="0"/>
+              <a:t>Los requisitos se mantienen en una lista priorizada llamada </a:t>
+            </a:r>
+            <a:r>
+              <a:rPr lang="es-AR" dirty="0" err="1" smtClean="0"/>
+              <a:t>Product</a:t>
+            </a:r>
+            <a:r>
+              <a:rPr lang="es-AR" dirty="0" smtClean="0"/>
+              <a:t> </a:t>
+            </a:r>
+            <a:r>
+              <a:rPr lang="es-AR" dirty="0" err="1" smtClean="0"/>
+              <a:t>Backlog</a:t>
+            </a:r>
+            <a:r>
+              <a:rPr lang="es-AR" dirty="0" smtClean="0"/>
+              <a:t>. Al </a:t>
+            </a:r>
+            <a:r>
+              <a:rPr lang="es-AR" dirty="0" smtClean="0"/>
+              <a:t>iniciar cada iteración (en la reunión de Sprint </a:t>
+            </a:r>
+            <a:r>
+              <a:rPr lang="es-AR" dirty="0" err="1" smtClean="0"/>
+              <a:t>Planning</a:t>
+            </a:r>
+            <a:r>
+              <a:rPr lang="es-AR" dirty="0" smtClean="0"/>
+              <a:t>), el equipo toma del </a:t>
+            </a:r>
+            <a:r>
+              <a:rPr lang="es-AR" dirty="0" err="1" smtClean="0"/>
+              <a:t>Product</a:t>
+            </a:r>
+            <a:r>
+              <a:rPr lang="es-AR" dirty="0" smtClean="0"/>
+              <a:t> </a:t>
+            </a:r>
+            <a:r>
+              <a:rPr lang="es-AR" dirty="0" err="1" smtClean="0"/>
+              <a:t>Backlog</a:t>
+            </a:r>
+            <a:r>
+              <a:rPr lang="es-AR" dirty="0" smtClean="0"/>
+              <a:t> </a:t>
+            </a:r>
+            <a:r>
+              <a:rPr lang="es-AR" dirty="0" smtClean="0"/>
+              <a:t>la cantidad de trabajo a la que se puede comprometer a terminar. El equipo trabaja durante el sprint, reuniéndose diariamente para revisar el estado del sprint </a:t>
+            </a:r>
+            <a:r>
+              <a:rPr lang="es-AR" dirty="0" err="1" smtClean="0"/>
+              <a:t>backlog</a:t>
+            </a:r>
+            <a:r>
+              <a:rPr lang="es-AR" dirty="0" smtClean="0"/>
+              <a:t> y presenta los resultados al cliente al final del sprint en la reunión Sprint </a:t>
+            </a:r>
+            <a:r>
+              <a:rPr lang="es-AR" dirty="0" err="1" smtClean="0"/>
+              <a:t>Review</a:t>
+            </a:r>
+            <a:r>
+              <a:rPr lang="es-AR" dirty="0" smtClean="0"/>
+              <a:t>.</a:t>
+            </a:r>
+          </a:p>
+          <a:p>
+            <a:r>
+              <a:rPr lang="es-AR" dirty="0" smtClean="0"/>
+              <a:t>En SCRUM es importante la participación del cliente para dar </a:t>
+            </a:r>
+            <a:r>
+              <a:rPr lang="es-AR" dirty="0" err="1" smtClean="0"/>
+              <a:t>feedback</a:t>
+            </a:r>
+            <a:r>
+              <a:rPr lang="es-AR" dirty="0" smtClean="0"/>
+              <a:t> el final de cada iteración y asegurarse de que lo que se esta construyendo es lo que el quiere.</a:t>
+            </a:r>
+          </a:p>
+          <a:p>
+            <a:r>
+              <a:rPr lang="es-AR" dirty="0" smtClean="0"/>
               <a:t>Una vez definida la metodología, veamos como vamos a administrar el proyecto?</a:t>
             </a:r>
           </a:p>
           <a:p>
             <a:pPr eaLnBrk="1" hangingPunct="1"/>
-            <a:endParaRPr lang="es-AR" smtClean="0"/>
+            <a:endParaRPr lang="es-AR" dirty="0" smtClean="0"/>
           </a:p>
         </p:txBody>
       </p:sp>
@@ -2763,12 +3416,23 @@
           <a:p>
             <a:pPr>
               <a:buFontTx/>
-              <a:buChar char="•"/>
+              <a:buNone/>
             </a:pPr>
             <a:r>
-              <a:rPr lang="es-AR" smtClean="0"/>
-              <a:t>La herramienta principal que planeamos utilizar es el PivotalTracker.</a:t>
-            </a:r>
+              <a:rPr lang="es-AR" dirty="0" smtClean="0"/>
+              <a:t>Speaker:</a:t>
+            </a:r>
+            <a:r>
+              <a:rPr lang="es-AR" baseline="0" dirty="0" smtClean="0"/>
+              <a:t> </a:t>
+            </a:r>
+          </a:p>
+          <a:p>
+            <a:pPr>
+              <a:buFontTx/>
+              <a:buNone/>
+            </a:pPr>
+            <a:endParaRPr lang="es-AR" dirty="0" smtClean="0"/>
           </a:p>
           <a:p>
             <a:pPr>
@@ -2776,9 +3440,18 @@
               <a:buChar char="•"/>
             </a:pPr>
             <a:r>
-              <a:rPr lang="es-AR" smtClean="0"/>
-              <a:t>Es una herramienta para administración de proyectos agiles, orientada a SCRUM. Permite administrar el backlog del proyecto de forma colaborativa.</a:t>
-            </a:r>
+              <a:rPr lang="es-AR" dirty="0" smtClean="0"/>
+              <a:t>La </a:t>
+            </a:r>
+            <a:r>
+              <a:rPr lang="es-AR" dirty="0" smtClean="0"/>
+              <a:t>herramienta principal que planeamos utilizar es </a:t>
+            </a:r>
+            <a:r>
+              <a:rPr lang="es-AR" dirty="0" smtClean="0"/>
+              <a:t>-------------------.</a:t>
+            </a:r>
+            <a:endParaRPr lang="es-AR" dirty="0" smtClean="0"/>
           </a:p>
           <a:p>
             <a:pPr>
@@ -2786,8 +3459,16 @@
               <a:buChar char="•"/>
             </a:pPr>
             <a:r>
-              <a:rPr lang="es-AR" smtClean="0"/>
-              <a:t>Es online, lo cual ayuda al tiempo de preparación.</a:t>
+              <a:rPr lang="es-AR" dirty="0" smtClean="0"/>
+              <a:t>Es una herramienta para administración de proyectos agiles, orientada a SCRUM. Permite administrar el </a:t>
+            </a:r>
+            <a:r>
+              <a:rPr lang="es-AR" dirty="0" err="1" smtClean="0"/>
+              <a:t>backlog</a:t>
+            </a:r>
+            <a:r>
+              <a:rPr lang="es-AR" dirty="0" smtClean="0"/>
+              <a:t> del proyecto de forma colaborativa.</a:t>
             </a:r>
           </a:p>
           <a:p>
@@ -2796,8 +3477,8 @@
               <a:buChar char="•"/>
             </a:pPr>
             <a:r>
-              <a:rPr lang="es-AR" smtClean="0"/>
-              <a:t>Permite priorizar los items del backlog, definir cuales se van a ejecutar en cada iteración y actualizar su estado a medida que se van ejecutando. </a:t>
+              <a:rPr lang="es-AR" dirty="0" smtClean="0"/>
+              <a:t>Es online, lo cual ayuda al tiempo de preparación.</a:t>
             </a:r>
           </a:p>
           <a:p>
@@ -2806,13 +3487,63 @@
               <a:buChar char="•"/>
             </a:pPr>
             <a:r>
-              <a:rPr lang="es-AR" smtClean="0"/>
-              <a:t>Ahora Ale nos va a contar un poco mas en detalle las herramientas que vamos a utilizar.</a:t>
+              <a:rPr lang="es-AR" dirty="0" smtClean="0"/>
+              <a:t>Permite priorizar los </a:t>
+            </a:r>
+            <a:r>
+              <a:rPr lang="es-AR" dirty="0" err="1" smtClean="0"/>
+              <a:t>items</a:t>
+            </a:r>
+            <a:r>
+              <a:rPr lang="es-AR" dirty="0" smtClean="0"/>
+              <a:t> del </a:t>
+            </a:r>
+            <a:r>
+              <a:rPr lang="es-AR" dirty="0" err="1" smtClean="0"/>
+              <a:t>backlog</a:t>
+            </a:r>
+            <a:r>
+              <a:rPr lang="es-AR" dirty="0" smtClean="0"/>
+              <a:t>, definir cuales se van a ejecutar en cada iteración y actualizar su estado a medida que se van ejecutando. </a:t>
+            </a:r>
+          </a:p>
+          <a:p>
+            <a:pPr>
+              <a:buFontTx/>
+              <a:buChar char="•"/>
+            </a:pPr>
+            <a:r>
+              <a:rPr lang="es-AR" dirty="0" smtClean="0"/>
+              <a:t>Ahora </a:t>
+            </a:r>
+            <a:r>
+              <a:rPr lang="es-AR" dirty="0" smtClean="0"/>
+              <a:t>--- nos </a:t>
+            </a:r>
+            <a:r>
+              <a:rPr lang="es-AR" dirty="0" smtClean="0"/>
+              <a:t>va a contar un poco mas en detalle las </a:t>
+            </a:r>
+            <a:r>
+              <a:rPr lang="es-AR" dirty="0" err="1" smtClean="0"/>
+              <a:t>tecnologias</a:t>
+            </a:r>
+            <a:r>
+              <a:rPr lang="es-AR" baseline="0" dirty="0" smtClean="0"/>
+              <a:t> </a:t>
+            </a:r>
+            <a:r>
+              <a:rPr lang="es-AR" dirty="0" smtClean="0"/>
+              <a:t>que </a:t>
+            </a:r>
+            <a:r>
+              <a:rPr lang="es-AR" dirty="0" smtClean="0"/>
+              <a:t>vamos a utilizar.</a:t>
             </a:r>
           </a:p>
           <a:p>
             <a:pPr eaLnBrk="1" hangingPunct="1"/>
-            <a:endParaRPr lang="es-AR" smtClean="0"/>
+            <a:endParaRPr lang="es-AR" dirty="0" smtClean="0"/>
           </a:p>
         </p:txBody>
       </p:sp>
@@ -2900,9 +3631,12 @@
           <a:lstStyle/>
           <a:p>
             <a:r>
-              <a:rPr lang="es-AR" smtClean="0"/>
-              <a:t>Logos de tecnologías: Windows, .NET, Visual Studio</a:t>
-            </a:r>
+              <a:rPr lang="es-AR" dirty="0" smtClean="0"/>
+              <a:t>Speaker: </a:t>
+            </a:r>
+          </a:p>
+          <a:p>
+            <a:endParaRPr lang="es-AR" dirty="0" smtClean="0"/>
           </a:p>
           <a:p>
             <a:pPr>
@@ -2910,8 +3644,20 @@
               <a:buChar char="•"/>
             </a:pPr>
             <a:r>
-              <a:rPr lang="es-AR" smtClean="0"/>
-              <a:t>Metiendonos un poco mas en los detalles del proyecto, nuestra idea es programar sobre Visual Studio, base en SQLServer 2008</a:t>
+              <a:rPr lang="es-AR" dirty="0" err="1" smtClean="0"/>
+              <a:t>Metiendonos</a:t>
+            </a:r>
+            <a:r>
+              <a:rPr lang="es-AR" dirty="0" smtClean="0"/>
+              <a:t> un poco mas en los detalles del proyecto, nuestra idea es programar sobre Visual Studio, base en </a:t>
+            </a:r>
+            <a:r>
+              <a:rPr lang="es-AR" dirty="0" err="1" smtClean="0"/>
+              <a:t>SQLServer</a:t>
+            </a:r>
+            <a:r>
+              <a:rPr lang="es-AR" dirty="0" smtClean="0"/>
+              <a:t> 2008</a:t>
             </a:r>
           </a:p>
           <a:p>
@@ -2920,13 +3666,13 @@
               <a:buChar char="•"/>
             </a:pPr>
             <a:r>
-              <a:rPr lang="es-AR" smtClean="0"/>
+              <a:rPr lang="es-AR" dirty="0" smtClean="0"/>
               <a:t>El sistema va a ser Web, para que los clientes usen el sistema a través de internet, esto permite acceder simplemente desde un browser, sin necesidad de instalar nada, y poder funcionar con muy bajos recursos.</a:t>
             </a:r>
           </a:p>
           <a:p>
             <a:pPr eaLnBrk="1" hangingPunct="1"/>
-            <a:endParaRPr lang="es-AR" smtClean="0"/>
+            <a:endParaRPr lang="es-AR" dirty="0" smtClean="0"/>
           </a:p>
         </p:txBody>
       </p:sp>
@@ -3016,84 +3762,150 @@
               <a:defRPr/>
             </a:pPr>
             <a:r>
-              <a:rPr lang="es-AR" b="1" dirty="0" smtClean="0">
+              <a:rPr lang="es-AR" b="0" dirty="0" smtClean="0">
                 <a:solidFill>
                   <a:schemeClr val="accent6">
                     <a:lumMod val="75000"/>
                   </a:schemeClr>
                 </a:solidFill>
               </a:rPr>
-              <a:t>WBS   </a:t>
-            </a:r>
-            <a:r>
-              <a:rPr lang="es-AR" dirty="0" smtClean="0">
+              <a:t>Speaker: </a:t>
+            </a:r>
+          </a:p>
+          <a:p>
+            <a:pPr eaLnBrk="1" hangingPunct="1">
+              <a:defRPr/>
+            </a:pPr>
+            <a:endParaRPr lang="es-AR" b="1" dirty="0" smtClean="0">
+              <a:solidFill>
+                <a:schemeClr val="accent6">
+                  <a:lumMod val="75000"/>
+                </a:schemeClr>
+              </a:solidFill>
+            </a:endParaRPr>
+          </a:p>
+          <a:p>
+            <a:pPr eaLnBrk="1" hangingPunct="1">
+              <a:defRPr/>
+            </a:pPr>
+            <a:r>
+              <a:rPr lang="es-AR" b="0" dirty="0" smtClean="0">
                 <a:solidFill>
                   <a:schemeClr val="accent6">
                     <a:lumMod val="75000"/>
                   </a:schemeClr>
                 </a:solidFill>
               </a:rPr>
-              <a:t>(</a:t>
-            </a:r>
-            <a:r>
-              <a:rPr lang="es-AR" dirty="0" err="1" smtClean="0">
-                <a:solidFill>
-                  <a:schemeClr val="accent6">
-                    <a:lumMod val="75000"/>
-                  </a:schemeClr>
-                </a:solidFill>
-              </a:rPr>
+              <a:t>Alcance:</a:t>
+            </a:r>
+            <a:endParaRPr lang="es-AR" dirty="0" smtClean="0"/>
+          </a:p>
+          <a:p>
+            <a:pPr eaLnBrk="1" hangingPunct="1">
+              <a:defRPr/>
+            </a:pPr>
+            <a:r>
+              <a:rPr lang="es-AR" dirty="0" smtClean="0"/>
+              <a:t>El alcance lo definiremos utilizando una WBS (</a:t>
+            </a:r>
+            <a:r>
+              <a:rPr lang="es-AR" dirty="0" err="1" smtClean="0"/>
               <a:t>Work</a:t>
             </a:r>
             <a:r>
-              <a:rPr lang="es-AR" dirty="0" smtClean="0">
-                <a:solidFill>
-                  <a:schemeClr val="accent6">
-                    <a:lumMod val="75000"/>
-                  </a:schemeClr>
-                </a:solidFill>
-              </a:rPr>
+              <a:rPr lang="es-AR" dirty="0" smtClean="0"/>
               <a:t> </a:t>
             </a:r>
             <a:r>
-              <a:rPr lang="es-AR" dirty="0" err="1" smtClean="0">
-                <a:solidFill>
-                  <a:schemeClr val="accent6">
-                    <a:lumMod val="75000"/>
-                  </a:schemeClr>
-                </a:solidFill>
-              </a:rPr>
+              <a:rPr lang="es-AR" dirty="0" err="1" smtClean="0"/>
               <a:t>Breakdown</a:t>
             </a:r>
             <a:r>
-              <a:rPr lang="es-AR" dirty="0" smtClean="0">
-                <a:solidFill>
-                  <a:schemeClr val="accent6">
-                    <a:lumMod val="75000"/>
-                  </a:schemeClr>
-                </a:solidFill>
-              </a:rPr>
+              <a:rPr lang="es-AR" dirty="0" smtClean="0"/>
               <a:t> </a:t>
             </a:r>
             <a:r>
-              <a:rPr lang="es-AR" dirty="0" err="1" smtClean="0">
-                <a:solidFill>
-                  <a:schemeClr val="accent6">
-                    <a:lumMod val="75000"/>
-                  </a:schemeClr>
-                </a:solidFill>
-              </a:rPr>
+              <a:rPr lang="es-AR" dirty="0" err="1" smtClean="0"/>
               <a:t>Structure</a:t>
             </a:r>
             <a:r>
-              <a:rPr lang="es-AR" dirty="0" smtClean="0">
-                <a:solidFill>
-                  <a:schemeClr val="accent6">
-                    <a:lumMod val="75000"/>
-                  </a:schemeClr>
-                </a:solidFill>
-              </a:rPr>
-              <a:t>)</a:t>
+              <a:rPr lang="es-AR" dirty="0" smtClean="0"/>
+              <a:t>) y su diccionario de datos </a:t>
+            </a:r>
+            <a:r>
+              <a:rPr lang="es-AR" dirty="0" smtClean="0"/>
+              <a:t>correspondiente</a:t>
+            </a:r>
+          </a:p>
+          <a:p>
+            <a:pPr eaLnBrk="1" hangingPunct="1">
+              <a:defRPr/>
+            </a:pPr>
+            <a:r>
+              <a:rPr lang="es-AR" dirty="0" smtClean="0"/>
+              <a:t>La</a:t>
+            </a:r>
+            <a:r>
+              <a:rPr lang="es-AR" baseline="0" dirty="0" smtClean="0"/>
+              <a:t> WBS o</a:t>
+            </a:r>
+            <a:r>
+              <a:rPr lang="es-AR" dirty="0" smtClean="0"/>
+              <a:t>rganiza </a:t>
+            </a:r>
+            <a:r>
+              <a:rPr lang="es-AR" dirty="0" smtClean="0"/>
+              <a:t>y define el Alcance Total del </a:t>
+            </a:r>
+            <a:r>
+              <a:rPr lang="es-AR" dirty="0" smtClean="0"/>
+              <a:t>proyecto</a:t>
+            </a:r>
+            <a:endParaRPr lang="es-AR" dirty="0" smtClean="0"/>
+          </a:p>
+          <a:p>
+            <a:pPr>
+              <a:defRPr/>
+            </a:pPr>
+            <a:r>
+              <a:rPr lang="es-AR" dirty="0" smtClean="0"/>
+              <a:t>–Define una jerarquía de entregables</a:t>
+            </a:r>
+          </a:p>
+          <a:p>
+            <a:pPr>
+              <a:defRPr/>
+            </a:pPr>
+            <a:r>
+              <a:rPr lang="es-AR" dirty="0" smtClean="0"/>
+              <a:t>–Incluye todo el esfuerzo requerido para lograr un entregable</a:t>
+            </a:r>
+          </a:p>
+          <a:p>
+            <a:pPr>
+              <a:defRPr/>
+            </a:pPr>
+            <a:r>
+              <a:rPr lang="es-AR" dirty="0" smtClean="0"/>
+              <a:t>–Se desarrolla dividiendo los entregables en elementos identificables y medibles</a:t>
+            </a:r>
+          </a:p>
+          <a:p>
+            <a:pPr>
+              <a:defRPr/>
+            </a:pPr>
+            <a:r>
+              <a:rPr lang="es-AR" dirty="0" smtClean="0"/>
+              <a:t>–Provee un marco para la generación de todos los entregables a lo largo del ciclo del proyecto</a:t>
+            </a:r>
+          </a:p>
+          <a:p>
+            <a:pPr>
+              <a:defRPr/>
+            </a:pPr>
+            <a:r>
+              <a:rPr lang="es-AR" dirty="0" smtClean="0"/>
+              <a:t>–Provee un medio para integrar y comprobar la performance técnica, de calendario y de costo </a:t>
             </a:r>
           </a:p>
           <a:p>
@@ -3108,131 +3920,25 @@
             </a:pPr>
             <a:r>
               <a:rPr lang="es-AR" dirty="0" smtClean="0"/>
-              <a:t>El alcance lo definiremos utilizando una WBS (</a:t>
-            </a:r>
-            <a:r>
-              <a:rPr lang="es-AR" dirty="0" err="1" smtClean="0"/>
-              <a:t>Work</a:t>
-            </a:r>
-            <a:r>
-              <a:rPr lang="es-AR" dirty="0" smtClean="0"/>
-              <a:t> </a:t>
-            </a:r>
-            <a:r>
-              <a:rPr lang="es-AR" dirty="0" err="1" smtClean="0"/>
-              <a:t>Breakdown</a:t>
-            </a:r>
-            <a:r>
-              <a:rPr lang="es-AR" dirty="0" smtClean="0"/>
-              <a:t> </a:t>
-            </a:r>
-            <a:r>
-              <a:rPr lang="es-AR" dirty="0" err="1" smtClean="0"/>
-              <a:t>Structure</a:t>
-            </a:r>
-            <a:r>
-              <a:rPr lang="es-AR" dirty="0" smtClean="0"/>
-              <a:t>) y su diccionario de datos correspondiente.</a:t>
-            </a:r>
-          </a:p>
-          <a:p>
-            <a:pPr eaLnBrk="1" hangingPunct="1">
-              <a:defRPr/>
-            </a:pPr>
-            <a:r>
-              <a:rPr lang="es-AR" dirty="0" smtClean="0"/>
-              <a:t>Organiza y define el Alcance Total del proyecto</a:t>
-            </a:r>
-          </a:p>
-          <a:p>
-            <a:pPr eaLnBrk="1" hangingPunct="1">
-              <a:defRPr/>
-            </a:pPr>
-            <a:endParaRPr lang="es-AR" dirty="0" smtClean="0"/>
-          </a:p>
-          <a:p>
-            <a:pPr>
-              <a:defRPr/>
-            </a:pPr>
-            <a:r>
-              <a:rPr lang="es-AR" dirty="0" smtClean="0"/>
-              <a:t>–Define una jerarquía de entregables</a:t>
-            </a:r>
-          </a:p>
-          <a:p>
-            <a:pPr>
-              <a:defRPr/>
-            </a:pPr>
-            <a:r>
-              <a:rPr lang="es-AR" dirty="0" smtClean="0"/>
-              <a:t>–Incluye todo el esfuerzo requerido para lograr un entregable</a:t>
-            </a:r>
-          </a:p>
-          <a:p>
-            <a:pPr>
-              <a:defRPr/>
-            </a:pPr>
-            <a:r>
-              <a:rPr lang="es-AR" dirty="0" smtClean="0"/>
-              <a:t>–Se desarrolla dividiendo los entregables en elementos identificables y medibles</a:t>
-            </a:r>
-          </a:p>
-          <a:p>
-            <a:pPr>
-              <a:defRPr/>
-            </a:pPr>
-            <a:r>
-              <a:rPr lang="es-AR" dirty="0" smtClean="0"/>
-              <a:t>–Provee un marco para la generación de todos los entregables a lo largo del ciclo del proyecto</a:t>
-            </a:r>
-          </a:p>
-          <a:p>
-            <a:pPr>
-              <a:defRPr/>
-            </a:pPr>
-            <a:r>
-              <a:rPr lang="es-AR" dirty="0" smtClean="0"/>
-              <a:t>–Provee un medio para integrar y comprobar la performance técnica, de calendario y de costo </a:t>
-            </a:r>
-          </a:p>
-          <a:p>
-            <a:pPr eaLnBrk="1" hangingPunct="1">
-              <a:defRPr/>
-            </a:pPr>
-            <a:endParaRPr lang="es-AR" dirty="0" smtClean="0"/>
-          </a:p>
-          <a:p>
-            <a:pPr eaLnBrk="1" hangingPunct="1">
-              <a:defRPr/>
-            </a:pPr>
-            <a:endParaRPr lang="es-AR" dirty="0" smtClean="0"/>
-          </a:p>
-          <a:p>
-            <a:pPr eaLnBrk="1" hangingPunct="1">
-              <a:defRPr/>
-            </a:pPr>
-            <a:r>
-              <a:rPr lang="es-AR" b="1" dirty="0" err="1" smtClean="0"/>
-              <a:t>Planning</a:t>
-            </a:r>
-            <a:r>
-              <a:rPr lang="es-AR" b="1" dirty="0" smtClean="0"/>
-              <a:t> </a:t>
-            </a:r>
-            <a:r>
-              <a:rPr lang="es-AR" b="1" dirty="0" err="1" smtClean="0"/>
-              <a:t>Poker</a:t>
-            </a:r>
-            <a:endParaRPr lang="es-AR" b="1" dirty="0" smtClean="0"/>
-          </a:p>
-          <a:p>
-            <a:pPr eaLnBrk="1" hangingPunct="1">
-              <a:defRPr/>
-            </a:pPr>
-            <a:endParaRPr lang="es-AR" dirty="0" smtClean="0"/>
-          </a:p>
-          <a:p>
-            <a:pPr eaLnBrk="1" hangingPunct="1">
+              <a:t>Estimaciones:</a:t>
+            </a:r>
+          </a:p>
+          <a:p>
+            <a:pPr marL="0" marR="0" indent="0" algn="l" defTabSz="914400" rtl="0" eaLnBrk="1" fontAlgn="base" latinLnBrk="0" hangingPunct="1">
+              <a:lnSpc>
+                <a:spcPct val="100000"/>
+              </a:lnSpc>
+              <a:spcBef>
+                <a:spcPct val="30000"/>
+              </a:spcBef>
+              <a:spcAft>
+                <a:spcPct val="0"/>
+              </a:spcAft>
+              <a:buClrTx/>
+              <a:buSzTx/>
+              <a:buFontTx/>
+              <a:buNone/>
+              <a:tabLst/>
               <a:defRPr/>
             </a:pPr>
             <a:r>
@@ -3241,7 +3947,153 @@
                   <a:srgbClr val="000000"/>
                 </a:solidFill>
               </a:rPr>
-              <a:t>Realizadas por el equipo de desarrollo</a:t>
+              <a:t>(Basados en la experiencia de los miembros del equipo), L</a:t>
+            </a:r>
+            <a:r>
+              <a:rPr lang="es-AR" dirty="0" smtClean="0"/>
+              <a:t>as</a:t>
+            </a:r>
+            <a:r>
+              <a:rPr lang="es-AR" baseline="0" dirty="0" smtClean="0"/>
+              <a:t> estimaciones se </a:t>
+            </a:r>
+            <a:r>
+              <a:rPr lang="es-AR" baseline="0" dirty="0" err="1" smtClean="0"/>
+              <a:t>haran</a:t>
+            </a:r>
+            <a:r>
+              <a:rPr lang="es-AR" baseline="0" dirty="0" smtClean="0"/>
+              <a:t> mediante la </a:t>
+            </a:r>
+            <a:r>
+              <a:rPr lang="es-AR" baseline="0" dirty="0" err="1" smtClean="0"/>
+              <a:t>tecnica</a:t>
+            </a:r>
+            <a:r>
+              <a:rPr lang="es-AR" baseline="0" dirty="0" smtClean="0"/>
+              <a:t> de </a:t>
+            </a:r>
+            <a:r>
+              <a:rPr lang="es-AR" baseline="0" dirty="0" err="1" smtClean="0"/>
+              <a:t>Planning</a:t>
+            </a:r>
+            <a:r>
+              <a:rPr lang="es-AR" baseline="0" dirty="0" smtClean="0"/>
+              <a:t> </a:t>
+            </a:r>
+            <a:r>
+              <a:rPr lang="es-AR" baseline="0" dirty="0" err="1" smtClean="0"/>
+              <a:t>Poker</a:t>
+            </a:r>
+            <a:r>
+              <a:rPr lang="es-AR" baseline="0" dirty="0" smtClean="0"/>
+              <a:t>. </a:t>
+            </a:r>
+            <a:r>
+              <a:rPr lang="es-AR" baseline="0" dirty="0" err="1" smtClean="0"/>
+              <a:t>Seran</a:t>
+            </a:r>
+            <a:r>
+              <a:rPr lang="es-AR" baseline="0" dirty="0" smtClean="0"/>
+              <a:t> r</a:t>
+            </a:r>
+            <a:r>
+              <a:rPr lang="es-AR" dirty="0" smtClean="0">
+                <a:solidFill>
+                  <a:srgbClr val="000000"/>
+                </a:solidFill>
+              </a:rPr>
+              <a:t>ealizadas </a:t>
+            </a:r>
+            <a:r>
+              <a:rPr lang="es-AR" dirty="0" smtClean="0">
+                <a:solidFill>
+                  <a:srgbClr val="000000"/>
+                </a:solidFill>
+              </a:rPr>
+              <a:t>por el equipo de </a:t>
+            </a:r>
+            <a:r>
+              <a:rPr lang="es-AR" dirty="0" smtClean="0">
+                <a:solidFill>
+                  <a:srgbClr val="000000"/>
+                </a:solidFill>
+              </a:rPr>
+              <a:t>desarrollo y desarrolladas </a:t>
+            </a:r>
+            <a:r>
+              <a:rPr lang="es-AR" dirty="0" smtClean="0">
+                <a:solidFill>
+                  <a:srgbClr val="000000"/>
+                </a:solidFill>
+              </a:rPr>
+              <a:t>en cada reunión de Sprint </a:t>
+            </a:r>
+            <a:r>
+              <a:rPr lang="es-AR" dirty="0" err="1" smtClean="0">
+                <a:solidFill>
+                  <a:srgbClr val="000000"/>
+                </a:solidFill>
+              </a:rPr>
+              <a:t>Planning</a:t>
+            </a:r>
+            <a:endParaRPr lang="es-AR" dirty="0" smtClean="0">
+              <a:solidFill>
+                <a:srgbClr val="000000"/>
+              </a:solidFill>
+            </a:endParaRPr>
+          </a:p>
+          <a:p>
+            <a:pPr eaLnBrk="1" hangingPunct="1">
+              <a:defRPr/>
+            </a:pPr>
+            <a:r>
+              <a:rPr lang="es-AR" dirty="0" err="1" smtClean="0"/>
+              <a:t>Planning</a:t>
+            </a:r>
+            <a:r>
+              <a:rPr lang="es-AR" baseline="0" dirty="0" smtClean="0"/>
+              <a:t> </a:t>
+            </a:r>
+            <a:r>
+              <a:rPr lang="es-AR" baseline="0" dirty="0" err="1" smtClean="0"/>
+              <a:t>Poker</a:t>
+            </a:r>
+            <a:r>
+              <a:rPr lang="es-AR" baseline="0" dirty="0" smtClean="0"/>
+              <a:t> e</a:t>
+            </a:r>
+            <a:r>
+              <a:rPr lang="es-AR" dirty="0" smtClean="0"/>
+              <a:t>s </a:t>
+            </a:r>
+            <a:r>
+              <a:rPr lang="es-AR" dirty="0" smtClean="0"/>
+              <a:t>una </a:t>
+            </a:r>
+            <a:r>
+              <a:rPr lang="es-AR" dirty="0" err="1" smtClean="0"/>
+              <a:t>tecnica</a:t>
+            </a:r>
+            <a:r>
+              <a:rPr lang="es-AR" dirty="0" smtClean="0"/>
+              <a:t> de </a:t>
+            </a:r>
+            <a:r>
+              <a:rPr lang="es-AR" dirty="0" err="1" smtClean="0"/>
+              <a:t>estimacion</a:t>
+            </a:r>
+            <a:r>
+              <a:rPr lang="es-AR" dirty="0" smtClean="0"/>
+              <a:t> donde varias personas primero debaten, y luego estiman cierto esfuerzo utilizando cartas con valores predefinidos, y las muestran en simultaneo. Luego, si hay extremos, se discute el por que de los mismos hasta llegar a un acuerdo. Existe una pagina web que permite la </a:t>
+            </a:r>
+            <a:r>
+              <a:rPr lang="es-AR" dirty="0" err="1" smtClean="0"/>
+              <a:t>realizacion</a:t>
+            </a:r>
+            <a:r>
+              <a:rPr lang="es-AR" dirty="0" smtClean="0"/>
+              <a:t> de este procedimiento online.</a:t>
             </a:r>
           </a:p>
           <a:p>
@@ -3259,26 +4111,113 @@
               <a:defRPr/>
             </a:pPr>
             <a:r>
-              <a:rPr lang="es-AR" dirty="0" smtClean="0">
-                <a:solidFill>
-                  <a:srgbClr val="000000"/>
-                </a:solidFill>
-              </a:rPr>
-              <a:t>Desarrolladas en cada reunión de Sprint </a:t>
-            </a:r>
-            <a:r>
-              <a:rPr lang="es-AR" dirty="0" err="1" smtClean="0">
-                <a:solidFill>
-                  <a:srgbClr val="000000"/>
-                </a:solidFill>
-              </a:rPr>
-              <a:t>Planning</a:t>
-            </a:r>
-            <a:endParaRPr lang="es-AR" dirty="0" smtClean="0">
-              <a:solidFill>
-                <a:srgbClr val="000000"/>
-              </a:solidFill>
-            </a:endParaRPr>
+              <a:rPr lang="es-AR" dirty="0" err="1" smtClean="0"/>
+              <a:t>Calendarizacion</a:t>
+            </a:r>
+            <a:r>
+              <a:rPr lang="es-AR" dirty="0" smtClean="0"/>
+              <a:t>: </a:t>
+            </a:r>
+            <a:r>
+              <a:rPr lang="es-AR" dirty="0" err="1" smtClean="0"/>
+              <a:t>B</a:t>
+            </a:r>
+            <a:r>
+              <a:rPr lang="es-AR" b="1" dirty="0" err="1" smtClean="0"/>
+              <a:t>acklog</a:t>
+            </a:r>
+            <a:r>
+              <a:rPr lang="es-AR" dirty="0" smtClean="0"/>
+              <a:t>. El </a:t>
+            </a:r>
+            <a:r>
+              <a:rPr lang="es-AR" dirty="0" smtClean="0"/>
+              <a:t>sistema permite </a:t>
+            </a:r>
+            <a:r>
+              <a:rPr lang="es-AR" dirty="0" smtClean="0"/>
+              <a:t>agregar </a:t>
+            </a:r>
+            <a:r>
+              <a:rPr lang="es-AR" dirty="0" err="1" smtClean="0"/>
+              <a:t>user</a:t>
+            </a:r>
+            <a:r>
+              <a:rPr lang="es-AR" dirty="0" smtClean="0"/>
+              <a:t> </a:t>
+            </a:r>
+            <a:r>
+              <a:rPr lang="es-AR" dirty="0" err="1" smtClean="0"/>
+              <a:t>stories</a:t>
+            </a:r>
+            <a:r>
+              <a:rPr lang="es-AR" dirty="0" smtClean="0"/>
+              <a:t> al </a:t>
+            </a:r>
+            <a:r>
+              <a:rPr lang="es-AR" dirty="0" err="1" smtClean="0"/>
+              <a:t>backlog</a:t>
+            </a:r>
+            <a:r>
+              <a:rPr lang="es-AR" dirty="0" smtClean="0"/>
+              <a:t>, y teniendo en cuenta la velocidad del equipo (</a:t>
+            </a:r>
+            <a:r>
+              <a:rPr lang="es-AR" dirty="0" err="1" smtClean="0"/>
+              <a:t>team</a:t>
+            </a:r>
+            <a:r>
+              <a:rPr lang="es-AR" dirty="0" smtClean="0"/>
+              <a:t> </a:t>
+            </a:r>
+            <a:r>
+              <a:rPr lang="es-AR" dirty="0" err="1" smtClean="0"/>
+              <a:t>velocity</a:t>
+            </a:r>
+            <a:r>
+              <a:rPr lang="es-AR" dirty="0" smtClean="0"/>
+              <a:t>), tomada una por default al comenzar el proyecto y luego calculada a partir de una </a:t>
+            </a:r>
+            <a:r>
+              <a:rPr lang="es-AR" dirty="0" err="1" smtClean="0"/>
+              <a:t>estadistica</a:t>
+            </a:r>
+            <a:r>
+              <a:rPr lang="es-AR" dirty="0" smtClean="0"/>
+              <a:t> de lo realmente completado, va dividiendo el trabajo por hacer en </a:t>
+            </a:r>
+            <a:r>
+              <a:rPr lang="es-AR" dirty="0" err="1" smtClean="0"/>
+              <a:t>sprints</a:t>
+            </a:r>
+            <a:r>
+              <a:rPr lang="es-AR" dirty="0" smtClean="0"/>
+              <a:t> fijando fechas (de acuerdo al valor de </a:t>
+            </a:r>
+            <a:r>
+              <a:rPr lang="es-AR" dirty="0" err="1" smtClean="0"/>
+              <a:t>duracion</a:t>
+            </a:r>
+            <a:r>
+              <a:rPr lang="es-AR" dirty="0" smtClean="0"/>
+              <a:t> de sprint dado en la </a:t>
+            </a:r>
+            <a:r>
+              <a:rPr lang="es-AR" dirty="0" err="1" smtClean="0"/>
+              <a:t>configuracion</a:t>
+            </a:r>
+            <a:r>
+              <a:rPr lang="es-AR" dirty="0" smtClean="0"/>
+              <a:t>), lo cual permite tener una </a:t>
+            </a:r>
+            <a:r>
+              <a:rPr lang="es-AR" dirty="0" err="1" smtClean="0"/>
+              <a:t>calendarizacion</a:t>
+            </a:r>
+            <a:r>
+              <a:rPr lang="es-AR" dirty="0" smtClean="0"/>
+              <a:t> de lo que se esta llevando a cabo.</a:t>
+            </a:r>
           </a:p>
           <a:p>
             <a:pPr eaLnBrk="1" hangingPunct="1">
@@ -3300,212 +4239,8 @@
                   <a:srgbClr val="000000"/>
                 </a:solidFill>
               </a:rPr>
-              <a:t>Basados en la experiencia de los miembros del equipo utilizaremos </a:t>
-            </a:r>
-            <a:r>
-              <a:rPr lang="es-AR" dirty="0" err="1" smtClean="0">
-                <a:solidFill>
-                  <a:srgbClr val="000000"/>
-                </a:solidFill>
-              </a:rPr>
-              <a:t>Planning</a:t>
-            </a:r>
-            <a:r>
-              <a:rPr lang="es-AR" dirty="0" smtClean="0">
-                <a:solidFill>
-                  <a:srgbClr val="000000"/>
-                </a:solidFill>
-              </a:rPr>
-              <a:t> </a:t>
-            </a:r>
-            <a:r>
-              <a:rPr lang="es-AR" dirty="0" err="1" smtClean="0">
-                <a:solidFill>
-                  <a:srgbClr val="000000"/>
-                </a:solidFill>
-              </a:rPr>
-              <a:t>Poker</a:t>
-            </a:r>
-            <a:endParaRPr lang="es-AR" dirty="0" smtClean="0">
-              <a:solidFill>
-                <a:srgbClr val="000000"/>
-              </a:solidFill>
-            </a:endParaRPr>
-          </a:p>
-          <a:p>
-            <a:pPr eaLnBrk="1" hangingPunct="1">
-              <a:defRPr/>
-            </a:pPr>
-            <a:endParaRPr lang="es-AR" dirty="0" smtClean="0">
-              <a:solidFill>
-                <a:srgbClr val="000000"/>
-              </a:solidFill>
-            </a:endParaRPr>
-          </a:p>
-          <a:p>
-            <a:pPr eaLnBrk="1" hangingPunct="1">
-              <a:defRPr/>
-            </a:pPr>
-            <a:r>
-              <a:rPr lang="es-AR" dirty="0" smtClean="0"/>
-              <a:t>Es una </a:t>
-            </a:r>
-            <a:r>
-              <a:rPr lang="es-AR" dirty="0" err="1" smtClean="0"/>
-              <a:t>tecnica</a:t>
-            </a:r>
-            <a:r>
-              <a:rPr lang="es-AR" dirty="0" smtClean="0"/>
-              <a:t> de </a:t>
-            </a:r>
-            <a:r>
-              <a:rPr lang="es-AR" dirty="0" err="1" smtClean="0"/>
-              <a:t>estimacion</a:t>
-            </a:r>
-            <a:r>
-              <a:rPr lang="es-AR" dirty="0" smtClean="0"/>
-              <a:t> donde varias personas primero debaten, y luego estiman cierto esfuerzo utilizando cartas con valores predefinidos, y las muestran en simultaneo. Luego, si hay extremos, se discute el por que de los mismos hasta llegar a un acuerdo. Existe una pagina web que permite la </a:t>
-            </a:r>
-            <a:r>
-              <a:rPr lang="es-AR" dirty="0" err="1" smtClean="0"/>
-              <a:t>realizacion</a:t>
-            </a:r>
-            <a:r>
-              <a:rPr lang="es-AR" dirty="0" smtClean="0"/>
-              <a:t> de este procedimiento online.</a:t>
-            </a:r>
-          </a:p>
-          <a:p>
-            <a:pPr eaLnBrk="1" hangingPunct="1">
-              <a:defRPr/>
-            </a:pPr>
-            <a:endParaRPr lang="es-AR" dirty="0" smtClean="0">
-              <a:solidFill>
-                <a:srgbClr val="000000"/>
-              </a:solidFill>
-            </a:endParaRPr>
-          </a:p>
-          <a:p>
-            <a:pPr eaLnBrk="1" hangingPunct="1">
-              <a:defRPr/>
-            </a:pPr>
-            <a:r>
-              <a:rPr lang="es-AR" dirty="0" smtClean="0"/>
-              <a:t>Calendario: </a:t>
-            </a:r>
-            <a:r>
-              <a:rPr lang="es-AR" dirty="0" err="1" smtClean="0"/>
-              <a:t>B</a:t>
-            </a:r>
-            <a:r>
-              <a:rPr lang="es-AR" b="1" dirty="0" err="1" smtClean="0"/>
-              <a:t>acklog</a:t>
-            </a:r>
-            <a:r>
-              <a:rPr lang="es-AR" dirty="0" smtClean="0"/>
-              <a:t>. El </a:t>
-            </a:r>
-            <a:r>
-              <a:rPr lang="es-AR" dirty="0" err="1" smtClean="0"/>
-              <a:t>pivotal</a:t>
-            </a:r>
-            <a:r>
-              <a:rPr lang="es-AR" dirty="0" smtClean="0"/>
-              <a:t> </a:t>
-            </a:r>
-            <a:r>
-              <a:rPr lang="es-AR" dirty="0" err="1" smtClean="0"/>
-              <a:t>tracker</a:t>
-            </a:r>
-            <a:r>
-              <a:rPr lang="es-AR" dirty="0" smtClean="0"/>
-              <a:t> permite agregar </a:t>
-            </a:r>
-            <a:r>
-              <a:rPr lang="es-AR" dirty="0" err="1" smtClean="0"/>
-              <a:t>user</a:t>
-            </a:r>
-            <a:r>
-              <a:rPr lang="es-AR" dirty="0" smtClean="0"/>
-              <a:t> </a:t>
-            </a:r>
-            <a:r>
-              <a:rPr lang="es-AR" dirty="0" err="1" smtClean="0"/>
-              <a:t>stories</a:t>
-            </a:r>
-            <a:r>
-              <a:rPr lang="es-AR" dirty="0" smtClean="0"/>
-              <a:t> al </a:t>
-            </a:r>
-            <a:r>
-              <a:rPr lang="es-AR" dirty="0" err="1" smtClean="0"/>
-              <a:t>backlog</a:t>
-            </a:r>
-            <a:r>
-              <a:rPr lang="es-AR" dirty="0" smtClean="0"/>
-              <a:t>, y teniendo en cuenta la velocidad del equipo (</a:t>
-            </a:r>
-            <a:r>
-              <a:rPr lang="es-AR" dirty="0" err="1" smtClean="0"/>
-              <a:t>team</a:t>
-            </a:r>
-            <a:r>
-              <a:rPr lang="es-AR" dirty="0" smtClean="0"/>
-              <a:t> </a:t>
-            </a:r>
-            <a:r>
-              <a:rPr lang="es-AR" dirty="0" err="1" smtClean="0"/>
-              <a:t>velocity</a:t>
-            </a:r>
-            <a:r>
-              <a:rPr lang="es-AR" dirty="0" smtClean="0"/>
-              <a:t>), tomada una por default al comenzar el proyecto y luego calculada a partir de una </a:t>
-            </a:r>
-            <a:r>
-              <a:rPr lang="es-AR" dirty="0" err="1" smtClean="0"/>
-              <a:t>estadistica</a:t>
-            </a:r>
-            <a:r>
-              <a:rPr lang="es-AR" dirty="0" smtClean="0"/>
-              <a:t> de lo realmente completado, va dividiendo el trabajo por hacer en </a:t>
-            </a:r>
-            <a:r>
-              <a:rPr lang="es-AR" dirty="0" err="1" smtClean="0"/>
-              <a:t>sprints</a:t>
-            </a:r>
-            <a:r>
-              <a:rPr lang="es-AR" dirty="0" smtClean="0"/>
-              <a:t> fijando fechas (de acuerdo al valor de </a:t>
-            </a:r>
-            <a:r>
-              <a:rPr lang="es-AR" dirty="0" err="1" smtClean="0"/>
-              <a:t>duracion</a:t>
-            </a:r>
-            <a:r>
-              <a:rPr lang="es-AR" dirty="0" smtClean="0"/>
-              <a:t> de sprint dado en la </a:t>
-            </a:r>
-            <a:r>
-              <a:rPr lang="es-AR" dirty="0" err="1" smtClean="0"/>
-              <a:t>configuracion</a:t>
-            </a:r>
-            <a:r>
-              <a:rPr lang="es-AR" dirty="0" smtClean="0"/>
-              <a:t>), lo cual permite tener una </a:t>
-            </a:r>
-            <a:r>
-              <a:rPr lang="es-AR" dirty="0" err="1" smtClean="0"/>
-              <a:t>calendarizacion</a:t>
-            </a:r>
-            <a:r>
-              <a:rPr lang="es-AR" dirty="0" smtClean="0"/>
-              <a:t> de lo que se esta llevando a cabo.</a:t>
-            </a:r>
-          </a:p>
-          <a:p>
-            <a:pPr eaLnBrk="1" hangingPunct="1">
-              <a:defRPr/>
-            </a:pPr>
+              <a:t>Equipo y Roles:</a:t>
+            </a:r>
             <a:endParaRPr lang="es-AR" dirty="0" smtClean="0">
               <a:solidFill>
                 <a:srgbClr val="000000"/>
@@ -3539,8 +4274,21 @@
                   <a:srgbClr val="000000"/>
                 </a:solidFill>
               </a:rPr>
-              <a:t>definido en un diagrama de a pares de Equipo de Trabajo</a:t>
-            </a:r>
+              <a:t>definido en un diagrama de a pares de Equipo de </a:t>
+            </a:r>
+            <a:r>
+              <a:rPr lang="es-AR" dirty="0" smtClean="0">
+                <a:solidFill>
+                  <a:srgbClr val="000000"/>
+                </a:solidFill>
+              </a:rPr>
+              <a:t>Trabajo</a:t>
+            </a:r>
+            <a:endParaRPr lang="es-AR" dirty="0" smtClean="0">
+              <a:solidFill>
+                <a:srgbClr val="000000"/>
+              </a:solidFill>
+            </a:endParaRPr>
           </a:p>
           <a:p>
             <a:pPr marL="342900" indent="-342900">
@@ -3555,25 +4303,6 @@
               <a:buChar char="¡"/>
               <a:defRPr/>
             </a:pPr>
-            <a:endParaRPr lang="es-AR" dirty="0" smtClean="0">
-              <a:solidFill>
-                <a:srgbClr val="000000"/>
-              </a:solidFill>
-            </a:endParaRPr>
-          </a:p>
-          <a:p>
-            <a:pPr marL="342900" indent="-342900">
-              <a:spcBef>
-                <a:spcPct val="20000"/>
-              </a:spcBef>
-              <a:buClr>
-                <a:schemeClr val="tx2"/>
-              </a:buClr>
-              <a:buSzPct val="70000"/>
-              <a:buFont typeface="Wingdings" pitchFamily="2" charset="2"/>
-              <a:buChar char="¡"/>
-              <a:defRPr/>
-            </a:pPr>
             <a:r>
               <a:rPr lang="es-AR" b="1" dirty="0" smtClean="0">
                 <a:solidFill>
@@ -3646,22 +4375,6 @@
               </a:rPr>
               <a:t>‏</a:t>
             </a:r>
-            <a:endParaRPr lang="es-AR" dirty="0" smtClean="0">
-              <a:solidFill>
-                <a:srgbClr val="000000"/>
-              </a:solidFill>
-            </a:endParaRPr>
-          </a:p>
-          <a:p>
-            <a:pPr eaLnBrk="1" hangingPunct="1">
-              <a:defRPr/>
-            </a:pPr>
-            <a:endParaRPr lang="es-AR" dirty="0" smtClean="0"/>
-          </a:p>
-          <a:p>
-            <a:pPr eaLnBrk="1" hangingPunct="1">
-              <a:defRPr/>
-            </a:pPr>
             <a:endParaRPr lang="es-AR" dirty="0" smtClean="0"/>
           </a:p>
           <a:p>
@@ -3763,6 +4476,47 @@
               </a:buClr>
               <a:buSzPct val="70000"/>
               <a:buFont typeface="Wingdings" pitchFamily="2" charset="2"/>
+              <a:buNone/>
+              <a:defRPr/>
+            </a:pPr>
+            <a:r>
+              <a:rPr lang="es-AR" dirty="0" smtClean="0">
+                <a:solidFill>
+                  <a:srgbClr val="000000"/>
+                </a:solidFill>
+              </a:rPr>
+              <a:t>Speaker: </a:t>
+            </a:r>
+          </a:p>
+          <a:p>
+            <a:pPr marL="342900" indent="-342900">
+              <a:spcBef>
+                <a:spcPct val="20000"/>
+              </a:spcBef>
+              <a:buClr>
+                <a:schemeClr val="tx2"/>
+              </a:buClr>
+              <a:buSzPct val="70000"/>
+              <a:buFont typeface="Wingdings" pitchFamily="2" charset="2"/>
+              <a:buNone/>
+              <a:defRPr/>
+            </a:pPr>
+            <a:endParaRPr lang="es-AR" dirty="0" smtClean="0">
+              <a:solidFill>
+                <a:srgbClr val="000000"/>
+              </a:solidFill>
+            </a:endParaRPr>
+          </a:p>
+          <a:p>
+            <a:pPr marL="342900" indent="-342900">
+              <a:spcBef>
+                <a:spcPct val="20000"/>
+              </a:spcBef>
+              <a:buClr>
+                <a:schemeClr val="tx2"/>
+              </a:buClr>
+              <a:buSzPct val="70000"/>
+              <a:buFont typeface="Wingdings" pitchFamily="2" charset="2"/>
               <a:buChar char="¡"/>
               <a:defRPr/>
             </a:pPr>
@@ -3780,7 +4534,15 @@
                   <a:srgbClr val="000000"/>
                 </a:solidFill>
               </a:rPr>
-              <a:t> por el equipo de trabajo durante cada Sprint</a:t>
+              <a:t> </a:t>
+            </a:r>
+            <a:r>
+              <a:rPr lang="es-AR" dirty="0" smtClean="0">
+                <a:solidFill>
+                  <a:srgbClr val="000000"/>
+                </a:solidFill>
+              </a:rPr>
+              <a:t>por el equipo de trabajo durante cada Sprint</a:t>
             </a:r>
           </a:p>
           <a:p>
@@ -3897,7 +4659,101 @@
           <a:lstStyle/>
           <a:p>
             <a:pPr eaLnBrk="1" hangingPunct="1"/>
-            <a:endParaRPr lang="es-AR" smtClean="0"/>
+            <a:r>
+              <a:rPr lang="es-AR" dirty="0" smtClean="0"/>
+              <a:t>Speaker:</a:t>
+            </a:r>
+          </a:p>
+          <a:p>
+            <a:pPr eaLnBrk="1" hangingPunct="1"/>
+            <a:endParaRPr lang="es-AR" dirty="0" smtClean="0"/>
+          </a:p>
+          <a:p>
+            <a:pPr eaLnBrk="1" hangingPunct="1"/>
+            <a:r>
+              <a:rPr lang="es-AR" dirty="0" smtClean="0"/>
+              <a:t>Nos</a:t>
+            </a:r>
+            <a:r>
+              <a:rPr lang="es-AR" baseline="0" dirty="0" smtClean="0"/>
+              <a:t> vamos a concentrar en la </a:t>
+            </a:r>
+            <a:r>
+              <a:rPr lang="es-AR" baseline="0" dirty="0" err="1" smtClean="0"/>
+              <a:t>documentacion</a:t>
+            </a:r>
+            <a:r>
+              <a:rPr lang="es-AR" baseline="0" dirty="0" smtClean="0"/>
+              <a:t> de </a:t>
+            </a:r>
+            <a:r>
+              <a:rPr lang="es-AR" baseline="0" dirty="0" err="1" smtClean="0"/>
+              <a:t>User</a:t>
+            </a:r>
+            <a:r>
+              <a:rPr lang="es-AR" baseline="0" dirty="0" smtClean="0"/>
+              <a:t> </a:t>
+            </a:r>
+            <a:r>
+              <a:rPr lang="es-AR" baseline="0" dirty="0" err="1" smtClean="0"/>
+              <a:t>Stories</a:t>
+            </a:r>
+            <a:r>
+              <a:rPr lang="es-AR" baseline="0" dirty="0" smtClean="0"/>
+              <a:t> que pasaran luego a formar parte del </a:t>
+            </a:r>
+            <a:r>
+              <a:rPr lang="es-AR" baseline="0" dirty="0" err="1" smtClean="0"/>
+              <a:t>Backlog</a:t>
+            </a:r>
+            <a:r>
+              <a:rPr lang="es-AR" baseline="0" dirty="0" smtClean="0"/>
+              <a:t>. Opcionalmente realizaremos diagramas de casos de uso si fuera necesario.</a:t>
+            </a:r>
+          </a:p>
+          <a:p>
+            <a:pPr eaLnBrk="1" hangingPunct="1"/>
+            <a:r>
+              <a:rPr lang="es-AR" baseline="0" dirty="0" err="1" smtClean="0"/>
+              <a:t>Tambien</a:t>
+            </a:r>
+            <a:r>
+              <a:rPr lang="es-AR" baseline="0" dirty="0" smtClean="0"/>
+              <a:t> vamos a realizar </a:t>
+            </a:r>
+            <a:r>
+              <a:rPr lang="es-AR" baseline="0" dirty="0" err="1" smtClean="0"/>
+              <a:t>mockup</a:t>
+            </a:r>
+            <a:r>
+              <a:rPr lang="es-AR" baseline="0" dirty="0" smtClean="0"/>
+              <a:t> de pantallas mediante la herramienta </a:t>
+            </a:r>
+            <a:r>
+              <a:rPr lang="es-AR" baseline="0" dirty="0" err="1" smtClean="0"/>
+              <a:t>Balsamiq</a:t>
+            </a:r>
+            <a:r>
+              <a:rPr lang="es-AR" baseline="0" dirty="0" smtClean="0"/>
+              <a:t>. Los </a:t>
+            </a:r>
+            <a:r>
+              <a:rPr lang="es-AR" baseline="0" dirty="0" err="1" smtClean="0"/>
+              <a:t>mockup</a:t>
+            </a:r>
+            <a:r>
+              <a:rPr lang="es-AR" baseline="0" dirty="0" smtClean="0"/>
+              <a:t> </a:t>
+            </a:r>
+            <a:r>
+              <a:rPr lang="es-AR" baseline="0" dirty="0" err="1" smtClean="0"/>
+              <a:t>seran</a:t>
+            </a:r>
+            <a:r>
+              <a:rPr lang="es-AR" baseline="0" dirty="0" smtClean="0"/>
+              <a:t> validados con el usuario hasta obtener un diseño satisfactorio</a:t>
+            </a:r>
+            <a:endParaRPr lang="es-AR" dirty="0" smtClean="0"/>
           </a:p>
         </p:txBody>
       </p:sp>
@@ -3985,7 +4841,59 @@
           <a:lstStyle/>
           <a:p>
             <a:pPr eaLnBrk="1" hangingPunct="1"/>
-            <a:endParaRPr lang="es-AR" smtClean="0"/>
+            <a:r>
+              <a:rPr lang="es-AR" dirty="0" smtClean="0"/>
+              <a:t>Speaker:</a:t>
+            </a:r>
+          </a:p>
+          <a:p>
+            <a:pPr eaLnBrk="1" hangingPunct="1"/>
+            <a:endParaRPr lang="es-AR" dirty="0" smtClean="0"/>
+          </a:p>
+          <a:p>
+            <a:pPr>
+              <a:buFont typeface="Arial" charset="0"/>
+              <a:buChar char="•"/>
+            </a:pPr>
+            <a:r>
+              <a:rPr lang="es-ES_tradnl" baseline="0" dirty="0" smtClean="0"/>
+              <a:t> Por el lado del versionado: Vamos a crear un documento de configuración que nos indique como nos vamos a manejar, lo que tenemos avanzado hasta el momento es que vamos a utilizar un servidor SVN (preferentemente Google </a:t>
+            </a:r>
+            <a:r>
+              <a:rPr lang="es-ES_tradnl" baseline="0" dirty="0" err="1" smtClean="0"/>
+              <a:t>Code</a:t>
+            </a:r>
+            <a:r>
+              <a:rPr lang="es-ES_tradnl" baseline="0" dirty="0" smtClean="0"/>
+              <a:t>), para comunicarnos con el servidor vamos a utilizar algún cliente de </a:t>
+            </a:r>
+            <a:r>
+              <a:rPr lang="es-ES_tradnl" baseline="0" dirty="0" err="1" smtClean="0"/>
+              <a:t>SubVersion</a:t>
+            </a:r>
+            <a:r>
+              <a:rPr lang="es-ES_tradnl" baseline="0" dirty="0" smtClean="0"/>
+              <a:t> (preferentemente el </a:t>
+            </a:r>
+            <a:r>
+              <a:rPr lang="es-ES_tradnl" baseline="0" dirty="0" err="1" smtClean="0"/>
+              <a:t>TortoiseSVN</a:t>
+            </a:r>
+            <a:r>
+              <a:rPr lang="es-ES_tradnl" baseline="0" dirty="0" smtClean="0"/>
+              <a:t>)</a:t>
+            </a:r>
+            <a:endParaRPr lang="es-AR" baseline="0" dirty="0" smtClean="0"/>
+          </a:p>
+          <a:p>
+            <a:pPr>
+              <a:buFont typeface="Arial" charset="0"/>
+              <a:buChar char="•"/>
+            </a:pPr>
+            <a:r>
+              <a:rPr lang="es-AR" baseline="0" dirty="0" smtClean="0"/>
+              <a:t> Por el lado de la configuración: Vamos a mantener un documento con toda la información de configuración de ambiente necesaria para utilizar y levantar la aplicación en un servidor.</a:t>
+            </a:r>
           </a:p>
         </p:txBody>
       </p:sp>
@@ -10902,11 +11810,7 @@
             <a:pPr eaLnBrk="1" hangingPunct="1"/>
             <a:r>
               <a:rPr lang="es-AR" dirty="0" smtClean="0"/>
-              <a:t>Arquitectura </a:t>
-            </a:r>
-            <a:r>
-              <a:rPr lang="es-AR" dirty="0" smtClean="0"/>
-              <a:t>y diseño</a:t>
+              <a:t>Arquitectura y diseño</a:t>
             </a:r>
           </a:p>
         </p:txBody>
@@ -11167,20 +12071,12 @@
               <a:rPr lang="es-AR" sz="3200" dirty="0" smtClean="0"/>
               <a:t>Seguimiento y control: </a:t>
             </a:r>
-            <a:r>
-              <a:rPr lang="es-AR" sz="3200" dirty="0" smtClean="0"/>
-              <a:t/>
-            </a:r>
             <a:br>
               <a:rPr lang="es-AR" sz="3200" dirty="0" smtClean="0"/>
             </a:br>
             <a:r>
               <a:rPr lang="es-AR" sz="3200" dirty="0" smtClean="0"/>
-              <a:t>Indicadores </a:t>
-            </a:r>
-            <a:r>
-              <a:rPr lang="es-AR" sz="3200" dirty="0" smtClean="0"/>
-              <a:t>y métricas</a:t>
+              <a:t>Indicadores y métricas</a:t>
             </a:r>
           </a:p>
         </p:txBody>
@@ -11469,20 +12365,12 @@
               <a:rPr lang="es-AR" sz="3200" dirty="0" smtClean="0"/>
               <a:t>Seguimiento y Control: </a:t>
             </a:r>
-            <a:r>
-              <a:rPr lang="es-AR" sz="3200" dirty="0" smtClean="0"/>
-              <a:t/>
-            </a:r>
             <a:br>
               <a:rPr lang="es-AR" sz="3200" dirty="0" smtClean="0"/>
             </a:br>
             <a:r>
               <a:rPr lang="es-AR" sz="3200" dirty="0" smtClean="0"/>
-              <a:t>Gestión </a:t>
-            </a:r>
-            <a:r>
-              <a:rPr lang="es-AR" sz="3200" dirty="0" smtClean="0"/>
-              <a:t>de riesgos</a:t>
+              <a:t>Gestión de riesgos</a:t>
             </a:r>
           </a:p>
         </p:txBody>
@@ -11755,21 +12643,8 @@
                   <a:srgbClr val="000000"/>
                 </a:solidFill>
               </a:rPr>
-              <a:t>Presentación del trabajo completado a los interesados: Al finalizar cada </a:t>
-            </a:r>
-            <a:r>
-              <a:rPr lang="es-AR" dirty="0" smtClean="0">
-                <a:solidFill>
-                  <a:srgbClr val="000000"/>
-                </a:solidFill>
-              </a:rPr>
-              <a:t>sprint</a:t>
-            </a:r>
-            <a:endParaRPr lang="es-AR" dirty="0" smtClean="0">
-              <a:solidFill>
-                <a:srgbClr val="000000"/>
-              </a:solidFill>
-            </a:endParaRPr>
+              <a:t>Presentación del trabajo completado a los interesados: Al finalizar cada sprint</a:t>
+            </a:r>
           </a:p>
         </p:txBody>
       </p:sp>
@@ -12665,10 +13540,9 @@
           <a:p>
             <a:pPr eaLnBrk="1" hangingPunct="1"/>
             <a:r>
-              <a:rPr lang="es-AR" dirty="0" smtClean="0"/>
-              <a:t>Entregas</a:t>
-            </a:r>
-            <a:endParaRPr lang="es-AR" dirty="0" smtClean="0"/>
+              <a:rPr lang="es-AR" smtClean="0"/>
+              <a:t>Trazabilidad</a:t>
+            </a:r>
           </a:p>
         </p:txBody>
       </p:sp>
@@ -13277,7 +14151,7 @@
       </p:grpSpPr>
       <p:sp>
         <p:nvSpPr>
-          <p:cNvPr id="21506" name="Rectangle 2"/>
+          <p:cNvPr id="22530" name="Rectangle 2"/>
           <p:cNvSpPr>
             <a:spLocks noGrp="1" noChangeArrowheads="1"/>
           </p:cNvSpPr>
@@ -13293,7 +14167,7 @@
             <a:pPr eaLnBrk="1" hangingPunct="1"/>
             <a:r>
               <a:rPr lang="es-AR" smtClean="0"/>
-              <a:t>Trazabilidad</a:t>
+              <a:t>Plan y estrategia de despliegue</a:t>
             </a:r>
           </a:p>
         </p:txBody>
@@ -13332,7 +14206,7 @@
       </p:grpSpPr>
       <p:sp>
         <p:nvSpPr>
-          <p:cNvPr id="22530" name="Rectangle 2"/>
+          <p:cNvPr id="23554" name="Rectangle 2"/>
           <p:cNvSpPr>
             <a:spLocks noGrp="1" noChangeArrowheads="1"/>
           </p:cNvSpPr>
@@ -13347,8 +14221,79 @@
           <a:p>
             <a:pPr eaLnBrk="1" hangingPunct="1"/>
             <a:r>
-              <a:rPr lang="es-AR" smtClean="0"/>
-              <a:t>Plan y estrategia de despliegue</a:t>
+              <a:rPr lang="es-AR" sz="3200" smtClean="0"/>
+              <a:t>Criterios de aceptación de la entrega</a:t>
+            </a:r>
+          </a:p>
+        </p:txBody>
+      </p:sp>
+      <p:sp>
+        <p:nvSpPr>
+          <p:cNvPr id="23555" name="Rectangle 3"/>
+          <p:cNvSpPr>
+            <a:spLocks noChangeArrowheads="1"/>
+          </p:cNvSpPr>
+          <p:nvPr/>
+        </p:nvSpPr>
+        <p:spPr bwMode="auto">
+          <a:xfrm>
+            <a:off x="1403350" y="1844675"/>
+            <a:ext cx="6840538" cy="4114800"/>
+          </a:xfrm>
+          <a:prstGeom prst="rect">
+            <a:avLst/>
+          </a:prstGeom>
+          <a:noFill/>
+          <a:ln w="9525">
+            <a:noFill/>
+            <a:miter lim="800000"/>
+            <a:headEnd/>
+            <a:tailEnd/>
+          </a:ln>
+        </p:spPr>
+        <p:txBody>
+          <a:bodyPr lIns="92075" tIns="46038" rIns="92075" bIns="46038"/>
+          <a:lstStyle/>
+          <a:p>
+            <a:pPr marL="342900" indent="-342900">
+              <a:spcBef>
+                <a:spcPct val="20000"/>
+              </a:spcBef>
+              <a:buClr>
+                <a:schemeClr val="tx2"/>
+              </a:buClr>
+              <a:buSzPct val="70000"/>
+              <a:buFont typeface="Wingdings" pitchFamily="2" charset="2"/>
+              <a:buChar char="¡"/>
+            </a:pPr>
+            <a:r>
+              <a:rPr lang="es-AR" sz="2900">
+                <a:solidFill>
+                  <a:srgbClr val="000000"/>
+                </a:solidFill>
+              </a:rPr>
+              <a:t>Se aceptarán aquellas funcionalidades que no presenten errores críticos.</a:t>
+            </a:r>
+          </a:p>
+          <a:p>
+            <a:pPr marL="342900" indent="-342900">
+              <a:spcBef>
+                <a:spcPct val="20000"/>
+              </a:spcBef>
+              <a:buClr>
+                <a:schemeClr val="tx2"/>
+              </a:buClr>
+              <a:buSzPct val="70000"/>
+              <a:buFont typeface="Wingdings" pitchFamily="2" charset="2"/>
+              <a:buChar char="¡"/>
+            </a:pPr>
+            <a:r>
+              <a:rPr lang="es-AR" sz="2900">
+                <a:solidFill>
+                  <a:srgbClr val="000000"/>
+                </a:solidFill>
+              </a:rPr>
+              <a:t>Los errores detectados en un Sprint deben ser corregidos para el próximo</a:t>
             </a:r>
           </a:p>
         </p:txBody>
@@ -13387,7 +14332,7 @@
       </p:grpSpPr>
       <p:sp>
         <p:nvSpPr>
-          <p:cNvPr id="23554" name="Rectangle 2"/>
+          <p:cNvPr id="4099" name="Rectangle 2"/>
           <p:cNvSpPr>
             <a:spLocks noGrp="1" noChangeArrowheads="1"/>
           </p:cNvSpPr>
@@ -13402,15 +14347,37 @@
           <a:p>
             <a:pPr eaLnBrk="1" hangingPunct="1"/>
             <a:r>
-              <a:rPr lang="es-AR" sz="3200" smtClean="0"/>
-              <a:t>Criterios de aceptación de la entrega</a:t>
-            </a:r>
-          </a:p>
-        </p:txBody>
-      </p:sp>
-      <p:sp>
-        <p:nvSpPr>
-          <p:cNvPr id="23555" name="Rectangle 3"/>
+              <a:rPr lang="es-AR" smtClean="0"/>
+              <a:t>Cierre y lecciones aprendidas</a:t>
+            </a:r>
+          </a:p>
+        </p:txBody>
+      </p:sp>
+      <p:graphicFrame>
+        <p:nvGraphicFramePr>
+          <p:cNvPr id="4098" name="Object 3"/>
+          <p:cNvGraphicFramePr>
+            <a:graphicFrameLocks noChangeAspect="1"/>
+          </p:cNvGraphicFramePr>
+          <p:nvPr>
+            <p:ph idx="1"/>
+          </p:nvPr>
+        </p:nvGraphicFramePr>
+        <p:xfrm>
+          <a:off x="2195513" y="1827221"/>
+          <a:ext cx="5256212" cy="2816225"/>
+        </p:xfrm>
+        <a:graphic>
+          <a:graphicData uri="http://schemas.openxmlformats.org/presentationml/2006/ole">
+            <p:oleObj spid="_x0000_s4098" name="Imagen de mapa de bits" r:id="rId4" imgW="4001058" imgH="2142857" progId="PBrush">
+              <p:embed/>
+            </p:oleObj>
+          </a:graphicData>
+        </a:graphic>
+      </p:graphicFrame>
+      <p:sp>
+        <p:nvSpPr>
+          <p:cNvPr id="4100" name="Rectangle 5"/>
           <p:cNvSpPr>
             <a:spLocks noChangeArrowheads="1"/>
           </p:cNvSpPr>
@@ -13418,8 +14385,8 @@
         </p:nvSpPr>
         <p:spPr bwMode="auto">
           <a:xfrm>
-            <a:off x="1403350" y="1844675"/>
-            <a:ext cx="6840538" cy="4114800"/>
+            <a:off x="1835150" y="4857759"/>
+            <a:ext cx="6840538" cy="1714513"/>
           </a:xfrm>
           <a:prstGeom prst="rect">
             <a:avLst/>
@@ -13448,33 +14415,54 @@
               <a:buChar char="¡"/>
             </a:pPr>
             <a:r>
-              <a:rPr lang="es-AR" sz="2900">
+              <a:rPr lang="es-AR" sz="2900" dirty="0">
                 <a:solidFill>
                   <a:srgbClr val="000000"/>
                 </a:solidFill>
               </a:rPr>
-              <a:t>Se aceptarán aquellas funcionalidades que no presenten errores críticos.</a:t>
-            </a:r>
-          </a:p>
-          <a:p>
-            <a:pPr marL="342900" indent="-342900">
+              <a:t>Reuniones de retrospectiva</a:t>
+            </a:r>
+          </a:p>
+          <a:p>
+            <a:pPr marL="742950" lvl="1" indent="-285750">
               <a:spcBef>
                 <a:spcPct val="20000"/>
               </a:spcBef>
               <a:buClr>
-                <a:schemeClr val="tx2"/>
+                <a:schemeClr val="accent2"/>
               </a:buClr>
               <a:buSzPct val="70000"/>
               <a:buFont typeface="Wingdings" pitchFamily="2" charset="2"/>
-              <a:buChar char="¡"/>
+              <a:buChar char="l"/>
             </a:pPr>
             <a:r>
-              <a:rPr lang="es-AR" sz="2900">
+              <a:rPr lang="es-AR" sz="2500" dirty="0">
                 <a:solidFill>
                   <a:srgbClr val="000000"/>
                 </a:solidFill>
               </a:rPr>
-              <a:t>Los errores detectados en un Sprint deben ser corregidos para el próximo</a:t>
+              <a:t>Al finalizar cada sprint</a:t>
+            </a:r>
+          </a:p>
+          <a:p>
+            <a:pPr marL="742950" lvl="1" indent="-285750">
+              <a:spcBef>
+                <a:spcPct val="20000"/>
+              </a:spcBef>
+              <a:buClr>
+                <a:schemeClr val="accent2"/>
+              </a:buClr>
+              <a:buSzPct val="70000"/>
+              <a:buFont typeface="Wingdings" pitchFamily="2" charset="2"/>
+              <a:buChar char="l"/>
+            </a:pPr>
+            <a:r>
+              <a:rPr lang="es-AR" sz="2500" dirty="0">
+                <a:solidFill>
+                  <a:srgbClr val="000000"/>
+                </a:solidFill>
+              </a:rPr>
+              <a:t>Al finalizar el proyecto</a:t>
             </a:r>
           </a:p>
         </p:txBody>
@@ -13513,175 +14501,6 @@
       </p:grpSpPr>
       <p:sp>
         <p:nvSpPr>
-          <p:cNvPr id="4099" name="Rectangle 2"/>
-          <p:cNvSpPr>
-            <a:spLocks noGrp="1" noChangeArrowheads="1"/>
-          </p:cNvSpPr>
-          <p:nvPr>
-            <p:ph type="title"/>
-          </p:nvPr>
-        </p:nvSpPr>
-        <p:spPr/>
-        <p:txBody>
-          <a:bodyPr/>
-          <a:lstStyle/>
-          <a:p>
-            <a:pPr eaLnBrk="1" hangingPunct="1"/>
-            <a:r>
-              <a:rPr lang="es-AR" smtClean="0"/>
-              <a:t>Cierre y lecciones aprendidas</a:t>
-            </a:r>
-          </a:p>
-        </p:txBody>
-      </p:sp>
-      <p:graphicFrame>
-        <p:nvGraphicFramePr>
-          <p:cNvPr id="4098" name="Object 3"/>
-          <p:cNvGraphicFramePr>
-            <a:graphicFrameLocks noChangeAspect="1"/>
-          </p:cNvGraphicFramePr>
-          <p:nvPr>
-            <p:ph idx="1"/>
-          </p:nvPr>
-        </p:nvGraphicFramePr>
-        <p:xfrm>
-          <a:off x="2195513" y="1827221"/>
-          <a:ext cx="5256212" cy="2816225"/>
-        </p:xfrm>
-        <a:graphic>
-          <a:graphicData uri="http://schemas.openxmlformats.org/presentationml/2006/ole">
-            <p:oleObj spid="_x0000_s4098" name="Imagen de mapa de bits" r:id="rId4" imgW="4001058" imgH="2142857" progId="PBrush">
-              <p:embed/>
-            </p:oleObj>
-          </a:graphicData>
-        </a:graphic>
-      </p:graphicFrame>
-      <p:sp>
-        <p:nvSpPr>
-          <p:cNvPr id="4100" name="Rectangle 5"/>
-          <p:cNvSpPr>
-            <a:spLocks noChangeArrowheads="1"/>
-          </p:cNvSpPr>
-          <p:nvPr/>
-        </p:nvSpPr>
-        <p:spPr bwMode="auto">
-          <a:xfrm>
-            <a:off x="1835150" y="4857759"/>
-            <a:ext cx="6840538" cy="1714513"/>
-          </a:xfrm>
-          <a:prstGeom prst="rect">
-            <a:avLst/>
-          </a:prstGeom>
-          <a:noFill/>
-          <a:ln w="9525">
-            <a:noFill/>
-            <a:miter lim="800000"/>
-            <a:headEnd/>
-            <a:tailEnd/>
-          </a:ln>
-        </p:spPr>
-        <p:txBody>
-          <a:bodyPr lIns="92075" tIns="46038" rIns="92075" bIns="46038"/>
-          <a:lstStyle/>
-          <a:p>
-            <a:pPr marL="342900" indent="-342900">
-              <a:spcBef>
-                <a:spcPct val="20000"/>
-              </a:spcBef>
-              <a:buClr>
-                <a:schemeClr val="tx2"/>
-              </a:buClr>
-              <a:buSzPct val="70000"/>
-              <a:buFont typeface="Wingdings" pitchFamily="2" charset="2"/>
-              <a:buChar char="¡"/>
-            </a:pPr>
-            <a:r>
-              <a:rPr lang="es-AR" sz="2900" dirty="0">
-                <a:solidFill>
-                  <a:srgbClr val="000000"/>
-                </a:solidFill>
-              </a:rPr>
-              <a:t>Reuniones de retrospectiva</a:t>
-            </a:r>
-          </a:p>
-          <a:p>
-            <a:pPr marL="742950" lvl="1" indent="-285750">
-              <a:spcBef>
-                <a:spcPct val="20000"/>
-              </a:spcBef>
-              <a:buClr>
-                <a:schemeClr val="accent2"/>
-              </a:buClr>
-              <a:buSzPct val="70000"/>
-              <a:buFont typeface="Wingdings" pitchFamily="2" charset="2"/>
-              <a:buChar char="l"/>
-            </a:pPr>
-            <a:r>
-              <a:rPr lang="es-AR" sz="2500" dirty="0">
-                <a:solidFill>
-                  <a:srgbClr val="000000"/>
-                </a:solidFill>
-              </a:rPr>
-              <a:t>Al finalizar cada sprint</a:t>
-            </a:r>
-          </a:p>
-          <a:p>
-            <a:pPr marL="742950" lvl="1" indent="-285750">
-              <a:spcBef>
-                <a:spcPct val="20000"/>
-              </a:spcBef>
-              <a:buClr>
-                <a:schemeClr val="accent2"/>
-              </a:buClr>
-              <a:buSzPct val="70000"/>
-              <a:buFont typeface="Wingdings" pitchFamily="2" charset="2"/>
-              <a:buChar char="l"/>
-            </a:pPr>
-            <a:r>
-              <a:rPr lang="es-AR" sz="2500" dirty="0">
-                <a:solidFill>
-                  <a:srgbClr val="000000"/>
-                </a:solidFill>
-              </a:rPr>
-              <a:t>Al finalizar el proyecto</a:t>
-            </a:r>
-          </a:p>
-        </p:txBody>
-      </p:sp>
-    </p:spTree>
-  </p:cSld>
-  <p:clrMapOvr>
-    <a:masterClrMapping/>
-  </p:clrMapOvr>
-  <p:timing>
-    <p:tnLst>
-      <p:par>
-        <p:cTn id="1" dur="indefinite" restart="never" nodeType="tmRoot"/>
-      </p:par>
-    </p:tnLst>
-  </p:timing>
-</p:sld>
-</file>
-
-<file path=ppt/slides/slide24.xml><?xml version="1.0" encoding="utf-8"?>
-<p:sld xmlns:a="http://schemas.openxmlformats.org/drawingml/2006/main" xmlns:r="http://schemas.openxmlformats.org/officeDocument/2006/relationships" xmlns:p="http://schemas.openxmlformats.org/presentationml/2006/main">
-  <p:cSld>
-    <p:spTree>
-      <p:nvGrpSpPr>
-        <p:cNvPr id="1" name=""/>
-        <p:cNvGrpSpPr/>
-        <p:nvPr/>
-      </p:nvGrpSpPr>
-      <p:grpSpPr>
-        <a:xfrm>
-          <a:off x="0" y="0"/>
-          <a:ext cx="0" cy="0"/>
-          <a:chOff x="0" y="0"/>
-          <a:chExt cx="0" cy="0"/>
-        </a:xfrm>
-      </p:grpSpPr>
-      <p:sp>
-        <p:nvSpPr>
           <p:cNvPr id="24578" name="Rectangle 4"/>
           <p:cNvSpPr>
             <a:spLocks noChangeArrowheads="1"/>
@@ -13815,7 +14634,7 @@
 </p:sld>
 </file>
 
-<file path=ppt/slides/slide25.xml><?xml version="1.0" encoding="utf-8"?>
+<file path=ppt/slides/slide24.xml><?xml version="1.0" encoding="utf-8"?>
 <p:sld xmlns:a="http://schemas.openxmlformats.org/drawingml/2006/main" xmlns:r="http://schemas.openxmlformats.org/officeDocument/2006/relationships" xmlns:p="http://schemas.openxmlformats.org/presentationml/2006/main">
   <p:cSld>
     <p:spTree>
@@ -16067,7 +16886,6 @@
               <a:rPr lang="es-AR" dirty="0" smtClean="0"/>
               <a:t>Análisis</a:t>
             </a:r>
-            <a:endParaRPr lang="es-AR" dirty="0" smtClean="0"/>
           </a:p>
         </p:txBody>
       </p:sp>
@@ -16109,7 +16927,6 @@
               <a:rPr lang="es-AR" sz="1100" b="1" dirty="0" smtClean="0"/>
               <a:t>Use Case 1</a:t>
             </a:r>
-            <a:endParaRPr lang="es-AR" sz="1100" b="1" dirty="0" smtClean="0"/>
           </a:p>
         </p:txBody>
       </p:sp>
@@ -16247,7 +17064,6 @@
               <a:rPr lang="es-AR" sz="1100" b="1" dirty="0" smtClean="0"/>
               <a:t>Use Case 2</a:t>
             </a:r>
-            <a:endParaRPr lang="es-AR" sz="1100" b="1" dirty="0" smtClean="0"/>
           </a:p>
         </p:txBody>
       </p:sp>

</xml_diff>